<commit_message>
Fixing broken link on schedule page
</commit_message>
<xml_diff>
--- a/ClassMaterials/GrammarsAndLanguages/GrammarsAndLanguages.pptx
+++ b/ClassMaterials/GrammarsAndLanguages/GrammarsAndLanguages.pptx
@@ -5,27 +5,26 @@
     <p:sldMasterId id="2147483695" r:id="rId1"/>
   </p:sldMasterIdLst>
   <p:notesMasterIdLst>
-    <p:notesMasterId r:id="rId17"/>
+    <p:notesMasterId r:id="rId16"/>
   </p:notesMasterIdLst>
   <p:handoutMasterIdLst>
-    <p:handoutMasterId r:id="rId18"/>
+    <p:handoutMasterId r:id="rId17"/>
   </p:handoutMasterIdLst>
   <p:sldIdLst>
     <p:sldId id="257" r:id="rId2"/>
-    <p:sldId id="389" r:id="rId3"/>
-    <p:sldId id="385" r:id="rId4"/>
-    <p:sldId id="393" r:id="rId5"/>
-    <p:sldId id="386" r:id="rId6"/>
-    <p:sldId id="387" r:id="rId7"/>
-    <p:sldId id="364" r:id="rId8"/>
-    <p:sldId id="390" r:id="rId9"/>
-    <p:sldId id="391" r:id="rId10"/>
-    <p:sldId id="365" r:id="rId11"/>
-    <p:sldId id="366" r:id="rId12"/>
-    <p:sldId id="367" r:id="rId13"/>
-    <p:sldId id="368" r:id="rId14"/>
-    <p:sldId id="392" r:id="rId15"/>
-    <p:sldId id="370" r:id="rId16"/>
+    <p:sldId id="385" r:id="rId3"/>
+    <p:sldId id="393" r:id="rId4"/>
+    <p:sldId id="386" r:id="rId5"/>
+    <p:sldId id="387" r:id="rId6"/>
+    <p:sldId id="364" r:id="rId7"/>
+    <p:sldId id="390" r:id="rId8"/>
+    <p:sldId id="391" r:id="rId9"/>
+    <p:sldId id="365" r:id="rId10"/>
+    <p:sldId id="366" r:id="rId11"/>
+    <p:sldId id="367" r:id="rId12"/>
+    <p:sldId id="368" r:id="rId13"/>
+    <p:sldId id="392" r:id="rId14"/>
+    <p:sldId id="370" r:id="rId15"/>
   </p:sldIdLst>
   <p:sldSz cx="12192000" cy="6858000"/>
   <p:notesSz cx="7315200" cy="9601200"/>
@@ -171,6 +170,27 @@
     </p:ext>
   </p:extLst>
 </p:presentation>
+</file>
+
+<file path=ppt/changesInfos/changesInfo1.xml><?xml version="1.0" encoding="utf-8"?>
+<pc:chgInfo xmlns:a="http://schemas.openxmlformats.org/drawingml/2006/main" xmlns:r="http://schemas.openxmlformats.org/officeDocument/2006/relationships" xmlns:ac="http://schemas.microsoft.com/office/drawing/2013/main/command" xmlns:pc="http://schemas.microsoft.com/office/powerpoint/2013/main/command">
+  <pc:docChgLst>
+    <pc:chgData name="Hewner, Mike" userId="7f3f83dd-6dfb-4127-a87f-c1714bd4fac9" providerId="ADAL" clId="{B90D4A5F-F356-42A4-B9F3-B54CAF8D6354}"/>
+    <pc:docChg chg="delSld">
+      <pc:chgData name="Hewner, Mike" userId="7f3f83dd-6dfb-4127-a87f-c1714bd4fac9" providerId="ADAL" clId="{B90D4A5F-F356-42A4-B9F3-B54CAF8D6354}" dt="2021-09-13T13:28:29.412" v="0" actId="47"/>
+      <pc:docMkLst>
+        <pc:docMk/>
+      </pc:docMkLst>
+      <pc:sldChg chg="del">
+        <pc:chgData name="Hewner, Mike" userId="7f3f83dd-6dfb-4127-a87f-c1714bd4fac9" providerId="ADAL" clId="{B90D4A5F-F356-42A4-B9F3-B54CAF8D6354}" dt="2021-09-13T13:28:29.412" v="0" actId="47"/>
+        <pc:sldMkLst>
+          <pc:docMk/>
+          <pc:sldMk cId="2608375894" sldId="389"/>
+        </pc:sldMkLst>
+      </pc:sldChg>
+    </pc:docChg>
+  </pc:docChgLst>
+</pc:chgInfo>
 </file>
 
 <file path=ppt/handoutMasters/handoutMaster1.xml><?xml version="1.0" encoding="utf-8"?>
@@ -7210,7 +7230,7 @@
             <a:fld id="{D2B72A2D-1FB5-4235-BD2A-A47C126380AE}" type="slidenum">
               <a:rPr lang="en-US" smtClean="0"/>
               <a:pPr/>
-              <a:t>15</a:t>
+              <a:t>14</a:t>
             </a:fld>
             <a:endParaRPr lang="en-US"/>
           </a:p>
@@ -7300,7 +7320,7 @@
             <a:fld id="{D2B72A2D-1FB5-4235-BD2A-A47C126380AE}" type="slidenum">
               <a:rPr lang="en-US" smtClean="0"/>
               <a:pPr/>
-              <a:t>3</a:t>
+              <a:t>2</a:t>
             </a:fld>
             <a:endParaRPr lang="en-US"/>
           </a:p>
@@ -7390,7 +7410,7 @@
             <a:fld id="{D2B72A2D-1FB5-4235-BD2A-A47C126380AE}" type="slidenum">
               <a:rPr lang="en-US" smtClean="0"/>
               <a:pPr/>
-              <a:t>5</a:t>
+              <a:t>4</a:t>
             </a:fld>
             <a:endParaRPr lang="en-US"/>
           </a:p>
@@ -7482,7 +7502,7 @@
             <a:fld id="{D2B72A2D-1FB5-4235-BD2A-A47C126380AE}" type="slidenum">
               <a:rPr lang="en-US" smtClean="0"/>
               <a:pPr/>
-              <a:t>6</a:t>
+              <a:t>5</a:t>
             </a:fld>
             <a:endParaRPr lang="en-US"/>
           </a:p>
@@ -7572,7 +7592,7 @@
             <a:fld id="{D2B72A2D-1FB5-4235-BD2A-A47C126380AE}" type="slidenum">
               <a:rPr lang="en-US" smtClean="0"/>
               <a:pPr/>
-              <a:t>7</a:t>
+              <a:t>6</a:t>
             </a:fld>
             <a:endParaRPr lang="en-US"/>
           </a:p>
@@ -7662,7 +7682,7 @@
             <a:fld id="{D2B72A2D-1FB5-4235-BD2A-A47C126380AE}" type="slidenum">
               <a:rPr lang="en-US" smtClean="0"/>
               <a:pPr/>
-              <a:t>8</a:t>
+              <a:t>7</a:t>
             </a:fld>
             <a:endParaRPr lang="en-US"/>
           </a:p>
@@ -7752,7 +7772,7 @@
             <a:fld id="{D2B72A2D-1FB5-4235-BD2A-A47C126380AE}" type="slidenum">
               <a:rPr lang="en-US" smtClean="0"/>
               <a:pPr/>
-              <a:t>9</a:t>
+              <a:t>8</a:t>
             </a:fld>
             <a:endParaRPr lang="en-US"/>
           </a:p>
@@ -7847,7 +7867,7 @@
             <a:fld id="{D2B72A2D-1FB5-4235-BD2A-A47C126380AE}" type="slidenum">
               <a:rPr lang="en-US" smtClean="0"/>
               <a:pPr/>
-              <a:t>11</a:t>
+              <a:t>10</a:t>
             </a:fld>
             <a:endParaRPr lang="en-US"/>
           </a:p>
@@ -7937,7 +7957,7 @@
             <a:fld id="{D2B72A2D-1FB5-4235-BD2A-A47C126380AE}" type="slidenum">
               <a:rPr lang="en-US" smtClean="0"/>
               <a:pPr/>
-              <a:t>13</a:t>
+              <a:t>12</a:t>
             </a:fld>
             <a:endParaRPr lang="en-US"/>
           </a:p>
@@ -13334,756 +13354,6 @@
 </file>
 
 <file path=ppt/slides/slide10.xml><?xml version="1.0" encoding="utf-8"?>
-<p:sld xmlns:a="http://schemas.openxmlformats.org/drawingml/2006/main" xmlns:r="http://schemas.openxmlformats.org/officeDocument/2006/relationships" xmlns:p="http://schemas.openxmlformats.org/presentationml/2006/main">
-  <p:cSld>
-    <p:spTree>
-      <p:nvGrpSpPr>
-        <p:cNvPr id="1" name=""/>
-        <p:cNvGrpSpPr/>
-        <p:nvPr/>
-      </p:nvGrpSpPr>
-      <p:grpSpPr>
-        <a:xfrm>
-          <a:off x="0" y="0"/>
-          <a:ext cx="0" cy="0"/>
-          <a:chOff x="0" y="0"/>
-          <a:chExt cx="0" cy="0"/>
-        </a:xfrm>
-      </p:grpSpPr>
-      <p:sp>
-        <p:nvSpPr>
-          <p:cNvPr id="411650" name="Rectangle 2"/>
-          <p:cNvSpPr>
-            <a:spLocks noGrp="1" noChangeArrowheads="1"/>
-          </p:cNvSpPr>
-          <p:nvPr>
-            <p:ph type="title"/>
-          </p:nvPr>
-        </p:nvSpPr>
-        <p:spPr/>
-        <p:txBody>
-          <a:bodyPr/>
-          <a:lstStyle/>
-          <a:p>
-            <a:r>
-              <a:rPr lang="en-US"/>
-              <a:t>Abbreviations: Extended BNF:</a:t>
-            </a:r>
-          </a:p>
-        </p:txBody>
-      </p:sp>
-      <p:sp>
-        <p:nvSpPr>
-          <p:cNvPr id="411651" name="Rectangle 3"/>
-          <p:cNvSpPr>
-            <a:spLocks noGrp="1" noChangeArrowheads="1"/>
-          </p:cNvSpPr>
-          <p:nvPr>
-            <p:ph type="body" idx="1"/>
-          </p:nvPr>
-        </p:nvSpPr>
-        <p:spPr/>
-        <p:txBody>
-          <a:bodyPr/>
-          <a:lstStyle/>
-          <a:p>
-            <a:pPr>
-              <a:lnSpc>
-                <a:spcPct val="90000"/>
-              </a:lnSpc>
-            </a:pPr>
-            <a:r>
-              <a:rPr lang="en-US" sz="2800" dirty="0"/>
-              <a:t>Often it is helpful to add features to the BNF notation.  Both of these features could be expressed in terms of “pure BNF”, so nothing new is added to what we can derive.</a:t>
-            </a:r>
-          </a:p>
-          <a:p>
-            <a:pPr>
-              <a:lnSpc>
-                <a:spcPct val="90000"/>
-              </a:lnSpc>
-            </a:pPr>
-            <a:r>
-              <a:rPr lang="en-US" sz="2800" dirty="0">
-                <a:solidFill>
-                  <a:schemeClr val="folHlink"/>
-                </a:solidFill>
-                <a:effectLst>
-                  <a:outerShdw blurRad="38100" dist="38100" dir="2700000" algn="tl">
-                    <a:srgbClr val="FFFFFF"/>
-                  </a:outerShdw>
-                </a:effectLst>
-              </a:rPr>
-              <a:t>{ string }*</a:t>
-            </a:r>
-            <a:r>
-              <a:rPr lang="en-US" sz="2800" dirty="0"/>
-              <a:t>  (a.k.a. </a:t>
-            </a:r>
-            <a:r>
-              <a:rPr lang="en-US" sz="2800" dirty="0" err="1"/>
-              <a:t>Kleene</a:t>
-            </a:r>
-            <a:r>
-              <a:rPr lang="en-US" sz="2800" dirty="0"/>
-              <a:t> *) stands for 0 or more occurrences of things derivable from </a:t>
-            </a:r>
-            <a:r>
-              <a:rPr lang="en-US" sz="2800" i="1" dirty="0"/>
-              <a:t>string</a:t>
-            </a:r>
-            <a:endParaRPr lang="en-US" sz="2800" dirty="0"/>
-          </a:p>
-          <a:p>
-            <a:pPr>
-              <a:lnSpc>
-                <a:spcPct val="90000"/>
-              </a:lnSpc>
-            </a:pPr>
-            <a:r>
-              <a:rPr lang="en-US" sz="2800" dirty="0">
-                <a:solidFill>
-                  <a:schemeClr val="folHlink"/>
-                </a:solidFill>
-                <a:effectLst>
-                  <a:outerShdw blurRad="38100" dist="38100" dir="2700000" algn="tl">
-                    <a:srgbClr val="FFFFFF"/>
-                  </a:outerShdw>
-                </a:effectLst>
-              </a:rPr>
-              <a:t>{ string }</a:t>
-            </a:r>
-            <a:r>
-              <a:rPr lang="en-US" baseline="30000" dirty="0">
-                <a:solidFill>
-                  <a:schemeClr val="folHlink"/>
-                </a:solidFill>
-                <a:effectLst>
-                  <a:outerShdw blurRad="38100" dist="38100" dir="2700000" algn="tl">
-                    <a:srgbClr val="FFFFFF"/>
-                  </a:outerShdw>
-                </a:effectLst>
-              </a:rPr>
-              <a:t>+</a:t>
-            </a:r>
-            <a:r>
-              <a:rPr lang="en-US" sz="2800" dirty="0"/>
-              <a:t> (a.k.a. </a:t>
-            </a:r>
-            <a:r>
-              <a:rPr lang="en-US" sz="2800" dirty="0" err="1"/>
-              <a:t>Kleene</a:t>
-            </a:r>
-            <a:r>
-              <a:rPr lang="en-US" sz="2800" dirty="0"/>
-              <a:t> +) stands for 1 or more occurrences of things derivable from </a:t>
-            </a:r>
-            <a:r>
-              <a:rPr lang="en-US" sz="2800" i="1" dirty="0"/>
-              <a:t>string</a:t>
-            </a:r>
-            <a:endParaRPr lang="en-US" sz="2800" dirty="0"/>
-          </a:p>
-          <a:p>
-            <a:pPr>
-              <a:lnSpc>
-                <a:spcPct val="90000"/>
-              </a:lnSpc>
-            </a:pPr>
-            <a:r>
-              <a:rPr lang="en-US" sz="2800" dirty="0"/>
-              <a:t>Example:</a:t>
-            </a:r>
-          </a:p>
-          <a:p>
-            <a:pPr lvl="1">
-              <a:lnSpc>
-                <a:spcPct val="90000"/>
-              </a:lnSpc>
-            </a:pPr>
-            <a:r>
-              <a:rPr lang="en-US" sz="2400" dirty="0"/>
-              <a:t>{&lt;digit&gt;}</a:t>
-            </a:r>
-            <a:r>
-              <a:rPr lang="en-US" sz="2400" baseline="30000" dirty="0"/>
-              <a:t>+ </a:t>
-            </a:r>
-            <a:r>
-              <a:rPr lang="en-US" sz="2400" dirty="0"/>
-              <a:t>. {&lt;digit&gt;}* E{&lt;digit&gt;}</a:t>
-            </a:r>
-            <a:r>
-              <a:rPr lang="en-US" sz="2400" baseline="30000" dirty="0"/>
-              <a:t>+</a:t>
-            </a:r>
-            <a:br>
-              <a:rPr lang="en-US" sz="2400" baseline="30000" dirty="0"/>
-            </a:br>
-            <a:r>
-              <a:rPr lang="en-US" sz="2400" dirty="0">
-                <a:solidFill>
-                  <a:srgbClr val="FFFF00"/>
-                </a:solidFill>
-              </a:rPr>
-              <a:t>Language:</a:t>
-            </a:r>
-            <a:r>
-              <a:rPr lang="en-US" sz="2400" dirty="0"/>
-              <a:t> certain numbers in scientific notation</a:t>
-            </a:r>
-          </a:p>
-          <a:p>
-            <a:pPr>
-              <a:lnSpc>
-                <a:spcPct val="90000"/>
-              </a:lnSpc>
-            </a:pPr>
-            <a:endParaRPr lang="en-US" sz="2800" dirty="0"/>
-          </a:p>
-        </p:txBody>
-      </p:sp>
-    </p:spTree>
-    <p:extLst>
-      <p:ext uri="{BB962C8B-B14F-4D97-AF65-F5344CB8AC3E}">
-        <p14:creationId xmlns:p14="http://schemas.microsoft.com/office/powerpoint/2010/main" val="400251963"/>
-      </p:ext>
-    </p:extLst>
-  </p:cSld>
-  <p:clrMapOvr>
-    <a:masterClrMapping/>
-  </p:clrMapOvr>
-  <p:timing>
-    <p:tnLst>
-      <p:par>
-        <p:cTn id="1" dur="indefinite" restart="never" nodeType="tmRoot">
-          <p:childTnLst>
-            <p:seq concurrent="1" nextAc="seek">
-              <p:cTn id="2" dur="indefinite" nodeType="mainSeq">
-                <p:childTnLst>
-                  <p:par>
-                    <p:cTn id="3" fill="hold">
-                      <p:stCondLst>
-                        <p:cond delay="indefinite"/>
-                      </p:stCondLst>
-                      <p:childTnLst>
-                        <p:par>
-                          <p:cTn id="4" fill="hold">
-                            <p:stCondLst>
-                              <p:cond delay="0"/>
-                            </p:stCondLst>
-                            <p:childTnLst>
-                              <p:par>
-                                <p:cTn id="5" presetID="2" presetClass="entr" presetSubtype="4" fill="hold" nodeType="clickEffect">
-                                  <p:stCondLst>
-                                    <p:cond delay="0"/>
-                                  </p:stCondLst>
-                                  <p:childTnLst>
-                                    <p:set>
-                                      <p:cBhvr>
-                                        <p:cTn id="6" dur="1" fill="hold">
-                                          <p:stCondLst>
-                                            <p:cond delay="0"/>
-                                          </p:stCondLst>
-                                        </p:cTn>
-                                        <p:tgtEl>
-                                          <p:spTgt spid="411651">
-                                            <p:txEl>
-                                              <p:pRg st="0" end="0"/>
-                                            </p:txEl>
-                                          </p:spTgt>
-                                        </p:tgtEl>
-                                        <p:attrNameLst>
-                                          <p:attrName>style.visibility</p:attrName>
-                                        </p:attrNameLst>
-                                      </p:cBhvr>
-                                      <p:to>
-                                        <p:strVal val="visible"/>
-                                      </p:to>
-                                    </p:set>
-                                    <p:anim calcmode="lin" valueType="num">
-                                      <p:cBhvr additive="base">
-                                        <p:cTn id="7" dur="500" fill="hold"/>
-                                        <p:tgtEl>
-                                          <p:spTgt spid="411651">
-                                            <p:txEl>
-                                              <p:pRg st="0" end="0"/>
-                                            </p:txEl>
-                                          </p:spTgt>
-                                        </p:tgtEl>
-                                        <p:attrNameLst>
-                                          <p:attrName>ppt_x</p:attrName>
-                                        </p:attrNameLst>
-                                      </p:cBhvr>
-                                      <p:tavLst>
-                                        <p:tav tm="0">
-                                          <p:val>
-                                            <p:strVal val="#ppt_x"/>
-                                          </p:val>
-                                        </p:tav>
-                                        <p:tav tm="100000">
-                                          <p:val>
-                                            <p:strVal val="#ppt_x"/>
-                                          </p:val>
-                                        </p:tav>
-                                      </p:tavLst>
-                                    </p:anim>
-                                    <p:anim calcmode="lin" valueType="num">
-                                      <p:cBhvr additive="base">
-                                        <p:cTn id="8" dur="500" fill="hold"/>
-                                        <p:tgtEl>
-                                          <p:spTgt spid="411651">
-                                            <p:txEl>
-                                              <p:pRg st="0" end="0"/>
-                                            </p:txEl>
-                                          </p:spTgt>
-                                        </p:tgtEl>
-                                        <p:attrNameLst>
-                                          <p:attrName>ppt_y</p:attrName>
-                                        </p:attrNameLst>
-                                      </p:cBhvr>
-                                      <p:tavLst>
-                                        <p:tav tm="0">
-                                          <p:val>
-                                            <p:strVal val="1+#ppt_h/2"/>
-                                          </p:val>
-                                        </p:tav>
-                                        <p:tav tm="100000">
-                                          <p:val>
-                                            <p:strVal val="#ppt_y"/>
-                                          </p:val>
-                                        </p:tav>
-                                      </p:tavLst>
-                                    </p:anim>
-                                  </p:childTnLst>
-                                </p:cTn>
-                              </p:par>
-                            </p:childTnLst>
-                          </p:cTn>
-                        </p:par>
-                      </p:childTnLst>
-                    </p:cTn>
-                  </p:par>
-                  <p:par>
-                    <p:cTn id="9" fill="hold">
-                      <p:stCondLst>
-                        <p:cond delay="indefinite"/>
-                      </p:stCondLst>
-                      <p:childTnLst>
-                        <p:par>
-                          <p:cTn id="10" fill="hold">
-                            <p:stCondLst>
-                              <p:cond delay="0"/>
-                            </p:stCondLst>
-                            <p:childTnLst>
-                              <p:par>
-                                <p:cTn id="11" presetID="2" presetClass="entr" presetSubtype="4" fill="hold" nodeType="clickEffect">
-                                  <p:stCondLst>
-                                    <p:cond delay="0"/>
-                                  </p:stCondLst>
-                                  <p:childTnLst>
-                                    <p:set>
-                                      <p:cBhvr>
-                                        <p:cTn id="12" dur="1" fill="hold">
-                                          <p:stCondLst>
-                                            <p:cond delay="0"/>
-                                          </p:stCondLst>
-                                        </p:cTn>
-                                        <p:tgtEl>
-                                          <p:spTgt spid="411651">
-                                            <p:txEl>
-                                              <p:pRg st="1" end="1"/>
-                                            </p:txEl>
-                                          </p:spTgt>
-                                        </p:tgtEl>
-                                        <p:attrNameLst>
-                                          <p:attrName>style.visibility</p:attrName>
-                                        </p:attrNameLst>
-                                      </p:cBhvr>
-                                      <p:to>
-                                        <p:strVal val="visible"/>
-                                      </p:to>
-                                    </p:set>
-                                    <p:anim calcmode="lin" valueType="num">
-                                      <p:cBhvr additive="base">
-                                        <p:cTn id="13" dur="500" fill="hold"/>
-                                        <p:tgtEl>
-                                          <p:spTgt spid="411651">
-                                            <p:txEl>
-                                              <p:pRg st="1" end="1"/>
-                                            </p:txEl>
-                                          </p:spTgt>
-                                        </p:tgtEl>
-                                        <p:attrNameLst>
-                                          <p:attrName>ppt_x</p:attrName>
-                                        </p:attrNameLst>
-                                      </p:cBhvr>
-                                      <p:tavLst>
-                                        <p:tav tm="0">
-                                          <p:val>
-                                            <p:strVal val="#ppt_x"/>
-                                          </p:val>
-                                        </p:tav>
-                                        <p:tav tm="100000">
-                                          <p:val>
-                                            <p:strVal val="#ppt_x"/>
-                                          </p:val>
-                                        </p:tav>
-                                      </p:tavLst>
-                                    </p:anim>
-                                    <p:anim calcmode="lin" valueType="num">
-                                      <p:cBhvr additive="base">
-                                        <p:cTn id="14" dur="500" fill="hold"/>
-                                        <p:tgtEl>
-                                          <p:spTgt spid="411651">
-                                            <p:txEl>
-                                              <p:pRg st="1" end="1"/>
-                                            </p:txEl>
-                                          </p:spTgt>
-                                        </p:tgtEl>
-                                        <p:attrNameLst>
-                                          <p:attrName>ppt_y</p:attrName>
-                                        </p:attrNameLst>
-                                      </p:cBhvr>
-                                      <p:tavLst>
-                                        <p:tav tm="0">
-                                          <p:val>
-                                            <p:strVal val="1+#ppt_h/2"/>
-                                          </p:val>
-                                        </p:tav>
-                                        <p:tav tm="100000">
-                                          <p:val>
-                                            <p:strVal val="#ppt_y"/>
-                                          </p:val>
-                                        </p:tav>
-                                      </p:tavLst>
-                                    </p:anim>
-                                  </p:childTnLst>
-                                </p:cTn>
-                              </p:par>
-                            </p:childTnLst>
-                          </p:cTn>
-                        </p:par>
-                      </p:childTnLst>
-                    </p:cTn>
-                  </p:par>
-                  <p:par>
-                    <p:cTn id="15" fill="hold">
-                      <p:stCondLst>
-                        <p:cond delay="indefinite"/>
-                      </p:stCondLst>
-                      <p:childTnLst>
-                        <p:par>
-                          <p:cTn id="16" fill="hold">
-                            <p:stCondLst>
-                              <p:cond delay="0"/>
-                            </p:stCondLst>
-                            <p:childTnLst>
-                              <p:par>
-                                <p:cTn id="17" presetID="2" presetClass="entr" presetSubtype="4" fill="hold" nodeType="clickEffect">
-                                  <p:stCondLst>
-                                    <p:cond delay="0"/>
-                                  </p:stCondLst>
-                                  <p:childTnLst>
-                                    <p:set>
-                                      <p:cBhvr>
-                                        <p:cTn id="18" dur="1" fill="hold">
-                                          <p:stCondLst>
-                                            <p:cond delay="0"/>
-                                          </p:stCondLst>
-                                        </p:cTn>
-                                        <p:tgtEl>
-                                          <p:spTgt spid="411651">
-                                            <p:txEl>
-                                              <p:pRg st="2" end="2"/>
-                                            </p:txEl>
-                                          </p:spTgt>
-                                        </p:tgtEl>
-                                        <p:attrNameLst>
-                                          <p:attrName>style.visibility</p:attrName>
-                                        </p:attrNameLst>
-                                      </p:cBhvr>
-                                      <p:to>
-                                        <p:strVal val="visible"/>
-                                      </p:to>
-                                    </p:set>
-                                    <p:anim calcmode="lin" valueType="num">
-                                      <p:cBhvr additive="base">
-                                        <p:cTn id="19" dur="500" fill="hold"/>
-                                        <p:tgtEl>
-                                          <p:spTgt spid="411651">
-                                            <p:txEl>
-                                              <p:pRg st="2" end="2"/>
-                                            </p:txEl>
-                                          </p:spTgt>
-                                        </p:tgtEl>
-                                        <p:attrNameLst>
-                                          <p:attrName>ppt_x</p:attrName>
-                                        </p:attrNameLst>
-                                      </p:cBhvr>
-                                      <p:tavLst>
-                                        <p:tav tm="0">
-                                          <p:val>
-                                            <p:strVal val="#ppt_x"/>
-                                          </p:val>
-                                        </p:tav>
-                                        <p:tav tm="100000">
-                                          <p:val>
-                                            <p:strVal val="#ppt_x"/>
-                                          </p:val>
-                                        </p:tav>
-                                      </p:tavLst>
-                                    </p:anim>
-                                    <p:anim calcmode="lin" valueType="num">
-                                      <p:cBhvr additive="base">
-                                        <p:cTn id="20" dur="500" fill="hold"/>
-                                        <p:tgtEl>
-                                          <p:spTgt spid="411651">
-                                            <p:txEl>
-                                              <p:pRg st="2" end="2"/>
-                                            </p:txEl>
-                                          </p:spTgt>
-                                        </p:tgtEl>
-                                        <p:attrNameLst>
-                                          <p:attrName>ppt_y</p:attrName>
-                                        </p:attrNameLst>
-                                      </p:cBhvr>
-                                      <p:tavLst>
-                                        <p:tav tm="0">
-                                          <p:val>
-                                            <p:strVal val="1+#ppt_h/2"/>
-                                          </p:val>
-                                        </p:tav>
-                                        <p:tav tm="100000">
-                                          <p:val>
-                                            <p:strVal val="#ppt_y"/>
-                                          </p:val>
-                                        </p:tav>
-                                      </p:tavLst>
-                                    </p:anim>
-                                  </p:childTnLst>
-                                </p:cTn>
-                              </p:par>
-                            </p:childTnLst>
-                          </p:cTn>
-                        </p:par>
-                      </p:childTnLst>
-                    </p:cTn>
-                  </p:par>
-                  <p:par>
-                    <p:cTn id="21" fill="hold">
-                      <p:stCondLst>
-                        <p:cond delay="indefinite"/>
-                      </p:stCondLst>
-                      <p:childTnLst>
-                        <p:par>
-                          <p:cTn id="22" fill="hold">
-                            <p:stCondLst>
-                              <p:cond delay="0"/>
-                            </p:stCondLst>
-                            <p:childTnLst>
-                              <p:par>
-                                <p:cTn id="23" presetID="2" presetClass="entr" presetSubtype="4" fill="hold" nodeType="clickEffect">
-                                  <p:stCondLst>
-                                    <p:cond delay="0"/>
-                                  </p:stCondLst>
-                                  <p:childTnLst>
-                                    <p:set>
-                                      <p:cBhvr>
-                                        <p:cTn id="24" dur="1" fill="hold">
-                                          <p:stCondLst>
-                                            <p:cond delay="0"/>
-                                          </p:stCondLst>
-                                        </p:cTn>
-                                        <p:tgtEl>
-                                          <p:spTgt spid="411651">
-                                            <p:txEl>
-                                              <p:pRg st="4" end="4"/>
-                                            </p:txEl>
-                                          </p:spTgt>
-                                        </p:tgtEl>
-                                        <p:attrNameLst>
-                                          <p:attrName>style.visibility</p:attrName>
-                                        </p:attrNameLst>
-                                      </p:cBhvr>
-                                      <p:to>
-                                        <p:strVal val="visible"/>
-                                      </p:to>
-                                    </p:set>
-                                    <p:anim calcmode="lin" valueType="num">
-                                      <p:cBhvr additive="base">
-                                        <p:cTn id="25" dur="500" fill="hold"/>
-                                        <p:tgtEl>
-                                          <p:spTgt spid="411651">
-                                            <p:txEl>
-                                              <p:pRg st="4" end="4"/>
-                                            </p:txEl>
-                                          </p:spTgt>
-                                        </p:tgtEl>
-                                        <p:attrNameLst>
-                                          <p:attrName>ppt_x</p:attrName>
-                                        </p:attrNameLst>
-                                      </p:cBhvr>
-                                      <p:tavLst>
-                                        <p:tav tm="0">
-                                          <p:val>
-                                            <p:strVal val="#ppt_x"/>
-                                          </p:val>
-                                        </p:tav>
-                                        <p:tav tm="100000">
-                                          <p:val>
-                                            <p:strVal val="#ppt_x"/>
-                                          </p:val>
-                                        </p:tav>
-                                      </p:tavLst>
-                                    </p:anim>
-                                    <p:anim calcmode="lin" valueType="num">
-                                      <p:cBhvr additive="base">
-                                        <p:cTn id="26" dur="500" fill="hold"/>
-                                        <p:tgtEl>
-                                          <p:spTgt spid="411651">
-                                            <p:txEl>
-                                              <p:pRg st="4" end="4"/>
-                                            </p:txEl>
-                                          </p:spTgt>
-                                        </p:tgtEl>
-                                        <p:attrNameLst>
-                                          <p:attrName>ppt_y</p:attrName>
-                                        </p:attrNameLst>
-                                      </p:cBhvr>
-                                      <p:tavLst>
-                                        <p:tav tm="0">
-                                          <p:val>
-                                            <p:strVal val="1+#ppt_h/2"/>
-                                          </p:val>
-                                        </p:tav>
-                                        <p:tav tm="100000">
-                                          <p:val>
-                                            <p:strVal val="#ppt_y"/>
-                                          </p:val>
-                                        </p:tav>
-                                      </p:tavLst>
-                                    </p:anim>
-                                  </p:childTnLst>
-                                </p:cTn>
-                              </p:par>
-                              <p:par>
-                                <p:cTn id="27" presetID="2" presetClass="entr" presetSubtype="4" fill="hold" nodeType="withEffect">
-                                  <p:stCondLst>
-                                    <p:cond delay="0"/>
-                                  </p:stCondLst>
-                                  <p:childTnLst>
-                                    <p:set>
-                                      <p:cBhvr>
-                                        <p:cTn id="28" dur="1" fill="hold">
-                                          <p:stCondLst>
-                                            <p:cond delay="0"/>
-                                          </p:stCondLst>
-                                        </p:cTn>
-                                        <p:tgtEl>
-                                          <p:spTgt spid="411651">
-                                            <p:txEl>
-                                              <p:pRg st="3" end="3"/>
-                                            </p:txEl>
-                                          </p:spTgt>
-                                        </p:tgtEl>
-                                        <p:attrNameLst>
-                                          <p:attrName>style.visibility</p:attrName>
-                                        </p:attrNameLst>
-                                      </p:cBhvr>
-                                      <p:to>
-                                        <p:strVal val="visible"/>
-                                      </p:to>
-                                    </p:set>
-                                    <p:anim calcmode="lin" valueType="num">
-                                      <p:cBhvr additive="base">
-                                        <p:cTn id="29" dur="500" fill="hold"/>
-                                        <p:tgtEl>
-                                          <p:spTgt spid="411651">
-                                            <p:txEl>
-                                              <p:pRg st="3" end="3"/>
-                                            </p:txEl>
-                                          </p:spTgt>
-                                        </p:tgtEl>
-                                        <p:attrNameLst>
-                                          <p:attrName>ppt_x</p:attrName>
-                                        </p:attrNameLst>
-                                      </p:cBhvr>
-                                      <p:tavLst>
-                                        <p:tav tm="0">
-                                          <p:val>
-                                            <p:strVal val="#ppt_x"/>
-                                          </p:val>
-                                        </p:tav>
-                                        <p:tav tm="100000">
-                                          <p:val>
-                                            <p:strVal val="#ppt_x"/>
-                                          </p:val>
-                                        </p:tav>
-                                      </p:tavLst>
-                                    </p:anim>
-                                    <p:anim calcmode="lin" valueType="num">
-                                      <p:cBhvr additive="base">
-                                        <p:cTn id="30" dur="500" fill="hold"/>
-                                        <p:tgtEl>
-                                          <p:spTgt spid="411651">
-                                            <p:txEl>
-                                              <p:pRg st="3" end="3"/>
-                                            </p:txEl>
-                                          </p:spTgt>
-                                        </p:tgtEl>
-                                        <p:attrNameLst>
-                                          <p:attrName>ppt_y</p:attrName>
-                                        </p:attrNameLst>
-                                      </p:cBhvr>
-                                      <p:tavLst>
-                                        <p:tav tm="0">
-                                          <p:val>
-                                            <p:strVal val="1+#ppt_h/2"/>
-                                          </p:val>
-                                        </p:tav>
-                                        <p:tav tm="100000">
-                                          <p:val>
-                                            <p:strVal val="#ppt_y"/>
-                                          </p:val>
-                                        </p:tav>
-                                      </p:tavLst>
-                                    </p:anim>
-                                  </p:childTnLst>
-                                </p:cTn>
-                              </p:par>
-                            </p:childTnLst>
-                          </p:cTn>
-                        </p:par>
-                      </p:childTnLst>
-                    </p:cTn>
-                  </p:par>
-                </p:childTnLst>
-              </p:cTn>
-              <p:prevCondLst>
-                <p:cond evt="onPrev" delay="0">
-                  <p:tgtEl>
-                    <p:sldTgt/>
-                  </p:tgtEl>
-                </p:cond>
-              </p:prevCondLst>
-              <p:nextCondLst>
-                <p:cond evt="onNext" delay="0">
-                  <p:tgtEl>
-                    <p:sldTgt/>
-                  </p:tgtEl>
-                </p:cond>
-              </p:nextCondLst>
-            </p:seq>
-          </p:childTnLst>
-        </p:cTn>
-      </p:par>
-    </p:tnLst>
-  </p:timing>
-</p:sld>
-</file>
-
-<file path=ppt/slides/slide11.xml><?xml version="1.0" encoding="utf-8"?>
 <p:sld xmlns:a="http://schemas.openxmlformats.org/drawingml/2006/main" xmlns:r="http://schemas.openxmlformats.org/officeDocument/2006/relationships" xmlns:p="http://schemas.openxmlformats.org/presentationml/2006/main" showMasterPhAnim="0">
   <p:cSld>
     <p:spTree>
@@ -14495,7 +13765,7 @@
 </p:sld>
 </file>
 
-<file path=ppt/slides/slide12.xml><?xml version="1.0" encoding="utf-8"?>
+<file path=ppt/slides/slide11.xml><?xml version="1.0" encoding="utf-8"?>
 <p:sld xmlns:a="http://schemas.openxmlformats.org/drawingml/2006/main" xmlns:r="http://schemas.openxmlformats.org/officeDocument/2006/relationships" xmlns:p="http://schemas.openxmlformats.org/presentationml/2006/main">
   <p:cSld>
     <p:spTree>
@@ -14716,7 +13986,7 @@
 </p:sld>
 </file>
 
-<file path=ppt/slides/slide13.xml><?xml version="1.0" encoding="utf-8"?>
+<file path=ppt/slides/slide12.xml><?xml version="1.0" encoding="utf-8"?>
 <p:sld xmlns:a="http://schemas.openxmlformats.org/drawingml/2006/main" xmlns:r="http://schemas.openxmlformats.org/officeDocument/2006/relationships" xmlns:p="http://schemas.openxmlformats.org/presentationml/2006/main">
   <p:cSld>
     <p:spTree>
@@ -15231,7 +14501,7 @@
 </p:sld>
 </file>
 
-<file path=ppt/slides/slide14.xml><?xml version="1.0" encoding="utf-8"?>
+<file path=ppt/slides/slide13.xml><?xml version="1.0" encoding="utf-8"?>
 <p:sld xmlns:a="http://schemas.openxmlformats.org/drawingml/2006/main" xmlns:r="http://schemas.openxmlformats.org/officeDocument/2006/relationships" xmlns:p="http://schemas.openxmlformats.org/presentationml/2006/main">
   <p:cSld>
     <p:spTree>
@@ -26877,7 +26147,7 @@
 </p:sld>
 </file>
 
-<file path=ppt/slides/slide15.xml><?xml version="1.0" encoding="utf-8"?>
+<file path=ppt/slides/slide14.xml><?xml version="1.0" encoding="utf-8"?>
 <p:sld xmlns:a="http://schemas.openxmlformats.org/drawingml/2006/main" xmlns:r="http://schemas.openxmlformats.org/officeDocument/2006/relationships" xmlns:p="http://schemas.openxmlformats.org/presentationml/2006/main">
   <p:cSld>
     <p:spTree>
@@ -27389,133 +26659,6 @@
 </file>
 
 <file path=ppt/slides/slide2.xml><?xml version="1.0" encoding="utf-8"?>
-<p:sld xmlns:a="http://schemas.openxmlformats.org/drawingml/2006/main" xmlns:r="http://schemas.openxmlformats.org/officeDocument/2006/relationships" xmlns:p="http://schemas.openxmlformats.org/presentationml/2006/main" show="0">
-  <p:cSld>
-    <p:spTree>
-      <p:nvGrpSpPr>
-        <p:cNvPr id="1" name=""/>
-        <p:cNvGrpSpPr/>
-        <p:nvPr/>
-      </p:nvGrpSpPr>
-      <p:grpSpPr>
-        <a:xfrm>
-          <a:off x="0" y="0"/>
-          <a:ext cx="0" cy="0"/>
-          <a:chOff x="0" y="0"/>
-          <a:chExt cx="0" cy="0"/>
-        </a:xfrm>
-      </p:grpSpPr>
-      <p:sp>
-        <p:nvSpPr>
-          <p:cNvPr id="2" name="Title 1">
-            <a:extLst>
-              <a:ext uri="{FF2B5EF4-FFF2-40B4-BE49-F238E27FC236}">
-                <a16:creationId xmlns:a16="http://schemas.microsoft.com/office/drawing/2014/main" id="{98295DFB-4F50-4C49-B982-E75BDDFD45CD}"/>
-              </a:ext>
-            </a:extLst>
-          </p:cNvPr>
-          <p:cNvSpPr>
-            <a:spLocks noGrp="1"/>
-          </p:cNvSpPr>
-          <p:nvPr>
-            <p:ph type="title"/>
-          </p:nvPr>
-        </p:nvSpPr>
-        <p:spPr/>
-        <p:txBody>
-          <a:bodyPr/>
-          <a:lstStyle/>
-          <a:p>
-            <a:endParaRPr lang="en-US"/>
-          </a:p>
-        </p:txBody>
-      </p:sp>
-      <p:sp>
-        <p:nvSpPr>
-          <p:cNvPr id="3" name="Content Placeholder 2">
-            <a:extLst>
-              <a:ext uri="{FF2B5EF4-FFF2-40B4-BE49-F238E27FC236}">
-                <a16:creationId xmlns:a16="http://schemas.microsoft.com/office/drawing/2014/main" id="{5E6D5D02-C6C3-47A7-8B5D-D4E0AE1EF666}"/>
-              </a:ext>
-            </a:extLst>
-          </p:cNvPr>
-          <p:cNvSpPr>
-            <a:spLocks noGrp="1"/>
-          </p:cNvSpPr>
-          <p:nvPr>
-            <p:ph idx="1"/>
-          </p:nvPr>
-        </p:nvSpPr>
-        <p:spPr/>
-        <p:txBody>
-          <a:bodyPr/>
-          <a:lstStyle/>
-          <a:p>
-            <a:endParaRPr lang="en-US"/>
-          </a:p>
-        </p:txBody>
-      </p:sp>
-      <p:pic>
-        <p:nvPicPr>
-          <p:cNvPr id="1026" name="Picture 2" descr="Image may contain: 7 people, people smiling, sky, cloud, outdoor, nature and water">
-            <a:extLst>
-              <a:ext uri="{FF2B5EF4-FFF2-40B4-BE49-F238E27FC236}">
-                <a16:creationId xmlns:a16="http://schemas.microsoft.com/office/drawing/2014/main" id="{E4FF1F2C-1F35-4BF1-B12E-34669E95659A}"/>
-              </a:ext>
-            </a:extLst>
-          </p:cNvPr>
-          <p:cNvPicPr>
-            <a:picLocks noChangeAspect="1" noChangeArrowheads="1"/>
-          </p:cNvPicPr>
-          <p:nvPr/>
-        </p:nvPicPr>
-        <p:blipFill>
-          <a:blip r:embed="rId2">
-            <a:extLst>
-              <a:ext uri="{28A0092B-C50C-407E-A947-70E740481C1C}">
-                <a14:useLocalDpi xmlns:a14="http://schemas.microsoft.com/office/drawing/2010/main" val="0"/>
-              </a:ext>
-            </a:extLst>
-          </a:blip>
-          <a:srcRect/>
-          <a:stretch>
-            <a:fillRect/>
-          </a:stretch>
-        </p:blipFill>
-        <p:spPr bwMode="auto">
-          <a:xfrm>
-            <a:off x="1524000" y="0"/>
-            <a:ext cx="9144000" cy="6858000"/>
-          </a:xfrm>
-          <a:prstGeom prst="rect">
-            <a:avLst/>
-          </a:prstGeom>
-          <a:noFill/>
-          <a:extLst>
-            <a:ext uri="{909E8E84-426E-40DD-AFC4-6F175D3DCCD1}">
-              <a14:hiddenFill xmlns:a14="http://schemas.microsoft.com/office/drawing/2010/main">
-                <a:solidFill>
-                  <a:srgbClr val="FFFFFF"/>
-                </a:solidFill>
-              </a14:hiddenFill>
-            </a:ext>
-          </a:extLst>
-        </p:spPr>
-      </p:pic>
-    </p:spTree>
-    <p:extLst>
-      <p:ext uri="{BB962C8B-B14F-4D97-AF65-F5344CB8AC3E}">
-        <p14:creationId xmlns:p14="http://schemas.microsoft.com/office/powerpoint/2010/main" val="2608375894"/>
-      </p:ext>
-    </p:extLst>
-  </p:cSld>
-  <p:clrMapOvr>
-    <a:masterClrMapping/>
-  </p:clrMapOvr>
-</p:sld>
-</file>
-
-<file path=ppt/slides/slide3.xml><?xml version="1.0" encoding="utf-8"?>
 <p:sld xmlns:a="http://schemas.openxmlformats.org/drawingml/2006/main" xmlns:r="http://schemas.openxmlformats.org/officeDocument/2006/relationships" xmlns:p="http://schemas.openxmlformats.org/presentationml/2006/main">
   <p:cSld>
     <p:spTree>
@@ -27649,7 +26792,7 @@
 </p:sld>
 </file>
 
-<file path=ppt/slides/slide4.xml><?xml version="1.0" encoding="utf-8"?>
+<file path=ppt/slides/slide3.xml><?xml version="1.0" encoding="utf-8"?>
 <p:sld xmlns:a="http://schemas.openxmlformats.org/drawingml/2006/main" xmlns:r="http://schemas.openxmlformats.org/officeDocument/2006/relationships" xmlns:p="http://schemas.openxmlformats.org/presentationml/2006/main">
   <p:cSld>
     <p:spTree>
@@ -27709,7 +26852,7 @@
 </p:sld>
 </file>
 
-<file path=ppt/slides/slide5.xml><?xml version="1.0" encoding="utf-8"?>
+<file path=ppt/slides/slide4.xml><?xml version="1.0" encoding="utf-8"?>
 <p:sld xmlns:a="http://schemas.openxmlformats.org/drawingml/2006/main" xmlns:r="http://schemas.openxmlformats.org/officeDocument/2006/relationships" xmlns:p="http://schemas.openxmlformats.org/presentationml/2006/main">
   <p:cSld>
     <p:spTree>
@@ -27795,7 +26938,7 @@
 </p:sld>
 </file>
 
-<file path=ppt/slides/slide6.xml><?xml version="1.0" encoding="utf-8"?>
+<file path=ppt/slides/slide5.xml><?xml version="1.0" encoding="utf-8"?>
 <p:sld xmlns:a="http://schemas.openxmlformats.org/drawingml/2006/main" xmlns:r="http://schemas.openxmlformats.org/officeDocument/2006/relationships" xmlns:p="http://schemas.openxmlformats.org/presentationml/2006/main">
   <p:cSld>
     <p:spTree>
@@ -27938,7 +27081,7 @@
 </p:sld>
 </file>
 
-<file path=ppt/slides/slide7.xml><?xml version="1.0" encoding="utf-8"?>
+<file path=ppt/slides/slide6.xml><?xml version="1.0" encoding="utf-8"?>
 <p:sld xmlns:a="http://schemas.openxmlformats.org/drawingml/2006/main" xmlns:r="http://schemas.openxmlformats.org/officeDocument/2006/relationships" xmlns:p="http://schemas.openxmlformats.org/presentationml/2006/main" showMasterPhAnim="0">
   <p:cSld>
     <p:spTree>
@@ -29025,7 +28168,7 @@
 </p:sld>
 </file>
 
-<file path=ppt/slides/slide8.xml><?xml version="1.0" encoding="utf-8"?>
+<file path=ppt/slides/slide7.xml><?xml version="1.0" encoding="utf-8"?>
 <p:sld xmlns:a="http://schemas.openxmlformats.org/drawingml/2006/main" xmlns:r="http://schemas.openxmlformats.org/officeDocument/2006/relationships" xmlns:p="http://schemas.openxmlformats.org/presentationml/2006/main" showMasterPhAnim="0">
   <p:cSld>
     <p:spTree>
@@ -29434,7 +28577,7 @@
 </p:sld>
 </file>
 
-<file path=ppt/slides/slide9.xml><?xml version="1.0" encoding="utf-8"?>
+<file path=ppt/slides/slide8.xml><?xml version="1.0" encoding="utf-8"?>
 <p:sld xmlns:a="http://schemas.openxmlformats.org/drawingml/2006/main" xmlns:r="http://schemas.openxmlformats.org/officeDocument/2006/relationships" xmlns:p="http://schemas.openxmlformats.org/presentationml/2006/main" showMasterPhAnim="0">
   <p:cSld>
     <p:spTree>
@@ -30553,6 +29696,756 @@
       <p:bldP spid="442371" grpId="0" uiExpand="1" build="p"/>
       <p:bldP spid="442379" grpId="0" animBg="1"/>
     </p:bldLst>
+  </p:timing>
+</p:sld>
+</file>
+
+<file path=ppt/slides/slide9.xml><?xml version="1.0" encoding="utf-8"?>
+<p:sld xmlns:a="http://schemas.openxmlformats.org/drawingml/2006/main" xmlns:r="http://schemas.openxmlformats.org/officeDocument/2006/relationships" xmlns:p="http://schemas.openxmlformats.org/presentationml/2006/main">
+  <p:cSld>
+    <p:spTree>
+      <p:nvGrpSpPr>
+        <p:cNvPr id="1" name=""/>
+        <p:cNvGrpSpPr/>
+        <p:nvPr/>
+      </p:nvGrpSpPr>
+      <p:grpSpPr>
+        <a:xfrm>
+          <a:off x="0" y="0"/>
+          <a:ext cx="0" cy="0"/>
+          <a:chOff x="0" y="0"/>
+          <a:chExt cx="0" cy="0"/>
+        </a:xfrm>
+      </p:grpSpPr>
+      <p:sp>
+        <p:nvSpPr>
+          <p:cNvPr id="411650" name="Rectangle 2"/>
+          <p:cNvSpPr>
+            <a:spLocks noGrp="1" noChangeArrowheads="1"/>
+          </p:cNvSpPr>
+          <p:nvPr>
+            <p:ph type="title"/>
+          </p:nvPr>
+        </p:nvSpPr>
+        <p:spPr/>
+        <p:txBody>
+          <a:bodyPr/>
+          <a:lstStyle/>
+          <a:p>
+            <a:r>
+              <a:rPr lang="en-US"/>
+              <a:t>Abbreviations: Extended BNF:</a:t>
+            </a:r>
+          </a:p>
+        </p:txBody>
+      </p:sp>
+      <p:sp>
+        <p:nvSpPr>
+          <p:cNvPr id="411651" name="Rectangle 3"/>
+          <p:cNvSpPr>
+            <a:spLocks noGrp="1" noChangeArrowheads="1"/>
+          </p:cNvSpPr>
+          <p:nvPr>
+            <p:ph type="body" idx="1"/>
+          </p:nvPr>
+        </p:nvSpPr>
+        <p:spPr/>
+        <p:txBody>
+          <a:bodyPr/>
+          <a:lstStyle/>
+          <a:p>
+            <a:pPr>
+              <a:lnSpc>
+                <a:spcPct val="90000"/>
+              </a:lnSpc>
+            </a:pPr>
+            <a:r>
+              <a:rPr lang="en-US" sz="2800" dirty="0"/>
+              <a:t>Often it is helpful to add features to the BNF notation.  Both of these features could be expressed in terms of “pure BNF”, so nothing new is added to what we can derive.</a:t>
+            </a:r>
+          </a:p>
+          <a:p>
+            <a:pPr>
+              <a:lnSpc>
+                <a:spcPct val="90000"/>
+              </a:lnSpc>
+            </a:pPr>
+            <a:r>
+              <a:rPr lang="en-US" sz="2800" dirty="0">
+                <a:solidFill>
+                  <a:schemeClr val="folHlink"/>
+                </a:solidFill>
+                <a:effectLst>
+                  <a:outerShdw blurRad="38100" dist="38100" dir="2700000" algn="tl">
+                    <a:srgbClr val="FFFFFF"/>
+                  </a:outerShdw>
+                </a:effectLst>
+              </a:rPr>
+              <a:t>{ string }*</a:t>
+            </a:r>
+            <a:r>
+              <a:rPr lang="en-US" sz="2800" dirty="0"/>
+              <a:t>  (a.k.a. </a:t>
+            </a:r>
+            <a:r>
+              <a:rPr lang="en-US" sz="2800" dirty="0" err="1"/>
+              <a:t>Kleene</a:t>
+            </a:r>
+            <a:r>
+              <a:rPr lang="en-US" sz="2800" dirty="0"/>
+              <a:t> *) stands for 0 or more occurrences of things derivable from </a:t>
+            </a:r>
+            <a:r>
+              <a:rPr lang="en-US" sz="2800" i="1" dirty="0"/>
+              <a:t>string</a:t>
+            </a:r>
+            <a:endParaRPr lang="en-US" sz="2800" dirty="0"/>
+          </a:p>
+          <a:p>
+            <a:pPr>
+              <a:lnSpc>
+                <a:spcPct val="90000"/>
+              </a:lnSpc>
+            </a:pPr>
+            <a:r>
+              <a:rPr lang="en-US" sz="2800" dirty="0">
+                <a:solidFill>
+                  <a:schemeClr val="folHlink"/>
+                </a:solidFill>
+                <a:effectLst>
+                  <a:outerShdw blurRad="38100" dist="38100" dir="2700000" algn="tl">
+                    <a:srgbClr val="FFFFFF"/>
+                  </a:outerShdw>
+                </a:effectLst>
+              </a:rPr>
+              <a:t>{ string }</a:t>
+            </a:r>
+            <a:r>
+              <a:rPr lang="en-US" baseline="30000" dirty="0">
+                <a:solidFill>
+                  <a:schemeClr val="folHlink"/>
+                </a:solidFill>
+                <a:effectLst>
+                  <a:outerShdw blurRad="38100" dist="38100" dir="2700000" algn="tl">
+                    <a:srgbClr val="FFFFFF"/>
+                  </a:outerShdw>
+                </a:effectLst>
+              </a:rPr>
+              <a:t>+</a:t>
+            </a:r>
+            <a:r>
+              <a:rPr lang="en-US" sz="2800" dirty="0"/>
+              <a:t> (a.k.a. </a:t>
+            </a:r>
+            <a:r>
+              <a:rPr lang="en-US" sz="2800" dirty="0" err="1"/>
+              <a:t>Kleene</a:t>
+            </a:r>
+            <a:r>
+              <a:rPr lang="en-US" sz="2800" dirty="0"/>
+              <a:t> +) stands for 1 or more occurrences of things derivable from </a:t>
+            </a:r>
+            <a:r>
+              <a:rPr lang="en-US" sz="2800" i="1" dirty="0"/>
+              <a:t>string</a:t>
+            </a:r>
+            <a:endParaRPr lang="en-US" sz="2800" dirty="0"/>
+          </a:p>
+          <a:p>
+            <a:pPr>
+              <a:lnSpc>
+                <a:spcPct val="90000"/>
+              </a:lnSpc>
+            </a:pPr>
+            <a:r>
+              <a:rPr lang="en-US" sz="2800" dirty="0"/>
+              <a:t>Example:</a:t>
+            </a:r>
+          </a:p>
+          <a:p>
+            <a:pPr lvl="1">
+              <a:lnSpc>
+                <a:spcPct val="90000"/>
+              </a:lnSpc>
+            </a:pPr>
+            <a:r>
+              <a:rPr lang="en-US" sz="2400" dirty="0"/>
+              <a:t>{&lt;digit&gt;}</a:t>
+            </a:r>
+            <a:r>
+              <a:rPr lang="en-US" sz="2400" baseline="30000" dirty="0"/>
+              <a:t>+ </a:t>
+            </a:r>
+            <a:r>
+              <a:rPr lang="en-US" sz="2400" dirty="0"/>
+              <a:t>. {&lt;digit&gt;}* E{&lt;digit&gt;}</a:t>
+            </a:r>
+            <a:r>
+              <a:rPr lang="en-US" sz="2400" baseline="30000" dirty="0"/>
+              <a:t>+</a:t>
+            </a:r>
+            <a:br>
+              <a:rPr lang="en-US" sz="2400" baseline="30000" dirty="0"/>
+            </a:br>
+            <a:r>
+              <a:rPr lang="en-US" sz="2400" dirty="0">
+                <a:solidFill>
+                  <a:srgbClr val="FFFF00"/>
+                </a:solidFill>
+              </a:rPr>
+              <a:t>Language:</a:t>
+            </a:r>
+            <a:r>
+              <a:rPr lang="en-US" sz="2400" dirty="0"/>
+              <a:t> certain numbers in scientific notation</a:t>
+            </a:r>
+          </a:p>
+          <a:p>
+            <a:pPr>
+              <a:lnSpc>
+                <a:spcPct val="90000"/>
+              </a:lnSpc>
+            </a:pPr>
+            <a:endParaRPr lang="en-US" sz="2800" dirty="0"/>
+          </a:p>
+        </p:txBody>
+      </p:sp>
+    </p:spTree>
+    <p:extLst>
+      <p:ext uri="{BB962C8B-B14F-4D97-AF65-F5344CB8AC3E}">
+        <p14:creationId xmlns:p14="http://schemas.microsoft.com/office/powerpoint/2010/main" val="400251963"/>
+      </p:ext>
+    </p:extLst>
+  </p:cSld>
+  <p:clrMapOvr>
+    <a:masterClrMapping/>
+  </p:clrMapOvr>
+  <p:timing>
+    <p:tnLst>
+      <p:par>
+        <p:cTn id="1" dur="indefinite" restart="never" nodeType="tmRoot">
+          <p:childTnLst>
+            <p:seq concurrent="1" nextAc="seek">
+              <p:cTn id="2" dur="indefinite" nodeType="mainSeq">
+                <p:childTnLst>
+                  <p:par>
+                    <p:cTn id="3" fill="hold">
+                      <p:stCondLst>
+                        <p:cond delay="indefinite"/>
+                      </p:stCondLst>
+                      <p:childTnLst>
+                        <p:par>
+                          <p:cTn id="4" fill="hold">
+                            <p:stCondLst>
+                              <p:cond delay="0"/>
+                            </p:stCondLst>
+                            <p:childTnLst>
+                              <p:par>
+                                <p:cTn id="5" presetID="2" presetClass="entr" presetSubtype="4" fill="hold" nodeType="clickEffect">
+                                  <p:stCondLst>
+                                    <p:cond delay="0"/>
+                                  </p:stCondLst>
+                                  <p:childTnLst>
+                                    <p:set>
+                                      <p:cBhvr>
+                                        <p:cTn id="6" dur="1" fill="hold">
+                                          <p:stCondLst>
+                                            <p:cond delay="0"/>
+                                          </p:stCondLst>
+                                        </p:cTn>
+                                        <p:tgtEl>
+                                          <p:spTgt spid="411651">
+                                            <p:txEl>
+                                              <p:pRg st="0" end="0"/>
+                                            </p:txEl>
+                                          </p:spTgt>
+                                        </p:tgtEl>
+                                        <p:attrNameLst>
+                                          <p:attrName>style.visibility</p:attrName>
+                                        </p:attrNameLst>
+                                      </p:cBhvr>
+                                      <p:to>
+                                        <p:strVal val="visible"/>
+                                      </p:to>
+                                    </p:set>
+                                    <p:anim calcmode="lin" valueType="num">
+                                      <p:cBhvr additive="base">
+                                        <p:cTn id="7" dur="500" fill="hold"/>
+                                        <p:tgtEl>
+                                          <p:spTgt spid="411651">
+                                            <p:txEl>
+                                              <p:pRg st="0" end="0"/>
+                                            </p:txEl>
+                                          </p:spTgt>
+                                        </p:tgtEl>
+                                        <p:attrNameLst>
+                                          <p:attrName>ppt_x</p:attrName>
+                                        </p:attrNameLst>
+                                      </p:cBhvr>
+                                      <p:tavLst>
+                                        <p:tav tm="0">
+                                          <p:val>
+                                            <p:strVal val="#ppt_x"/>
+                                          </p:val>
+                                        </p:tav>
+                                        <p:tav tm="100000">
+                                          <p:val>
+                                            <p:strVal val="#ppt_x"/>
+                                          </p:val>
+                                        </p:tav>
+                                      </p:tavLst>
+                                    </p:anim>
+                                    <p:anim calcmode="lin" valueType="num">
+                                      <p:cBhvr additive="base">
+                                        <p:cTn id="8" dur="500" fill="hold"/>
+                                        <p:tgtEl>
+                                          <p:spTgt spid="411651">
+                                            <p:txEl>
+                                              <p:pRg st="0" end="0"/>
+                                            </p:txEl>
+                                          </p:spTgt>
+                                        </p:tgtEl>
+                                        <p:attrNameLst>
+                                          <p:attrName>ppt_y</p:attrName>
+                                        </p:attrNameLst>
+                                      </p:cBhvr>
+                                      <p:tavLst>
+                                        <p:tav tm="0">
+                                          <p:val>
+                                            <p:strVal val="1+#ppt_h/2"/>
+                                          </p:val>
+                                        </p:tav>
+                                        <p:tav tm="100000">
+                                          <p:val>
+                                            <p:strVal val="#ppt_y"/>
+                                          </p:val>
+                                        </p:tav>
+                                      </p:tavLst>
+                                    </p:anim>
+                                  </p:childTnLst>
+                                </p:cTn>
+                              </p:par>
+                            </p:childTnLst>
+                          </p:cTn>
+                        </p:par>
+                      </p:childTnLst>
+                    </p:cTn>
+                  </p:par>
+                  <p:par>
+                    <p:cTn id="9" fill="hold">
+                      <p:stCondLst>
+                        <p:cond delay="indefinite"/>
+                      </p:stCondLst>
+                      <p:childTnLst>
+                        <p:par>
+                          <p:cTn id="10" fill="hold">
+                            <p:stCondLst>
+                              <p:cond delay="0"/>
+                            </p:stCondLst>
+                            <p:childTnLst>
+                              <p:par>
+                                <p:cTn id="11" presetID="2" presetClass="entr" presetSubtype="4" fill="hold" nodeType="clickEffect">
+                                  <p:stCondLst>
+                                    <p:cond delay="0"/>
+                                  </p:stCondLst>
+                                  <p:childTnLst>
+                                    <p:set>
+                                      <p:cBhvr>
+                                        <p:cTn id="12" dur="1" fill="hold">
+                                          <p:stCondLst>
+                                            <p:cond delay="0"/>
+                                          </p:stCondLst>
+                                        </p:cTn>
+                                        <p:tgtEl>
+                                          <p:spTgt spid="411651">
+                                            <p:txEl>
+                                              <p:pRg st="1" end="1"/>
+                                            </p:txEl>
+                                          </p:spTgt>
+                                        </p:tgtEl>
+                                        <p:attrNameLst>
+                                          <p:attrName>style.visibility</p:attrName>
+                                        </p:attrNameLst>
+                                      </p:cBhvr>
+                                      <p:to>
+                                        <p:strVal val="visible"/>
+                                      </p:to>
+                                    </p:set>
+                                    <p:anim calcmode="lin" valueType="num">
+                                      <p:cBhvr additive="base">
+                                        <p:cTn id="13" dur="500" fill="hold"/>
+                                        <p:tgtEl>
+                                          <p:spTgt spid="411651">
+                                            <p:txEl>
+                                              <p:pRg st="1" end="1"/>
+                                            </p:txEl>
+                                          </p:spTgt>
+                                        </p:tgtEl>
+                                        <p:attrNameLst>
+                                          <p:attrName>ppt_x</p:attrName>
+                                        </p:attrNameLst>
+                                      </p:cBhvr>
+                                      <p:tavLst>
+                                        <p:tav tm="0">
+                                          <p:val>
+                                            <p:strVal val="#ppt_x"/>
+                                          </p:val>
+                                        </p:tav>
+                                        <p:tav tm="100000">
+                                          <p:val>
+                                            <p:strVal val="#ppt_x"/>
+                                          </p:val>
+                                        </p:tav>
+                                      </p:tavLst>
+                                    </p:anim>
+                                    <p:anim calcmode="lin" valueType="num">
+                                      <p:cBhvr additive="base">
+                                        <p:cTn id="14" dur="500" fill="hold"/>
+                                        <p:tgtEl>
+                                          <p:spTgt spid="411651">
+                                            <p:txEl>
+                                              <p:pRg st="1" end="1"/>
+                                            </p:txEl>
+                                          </p:spTgt>
+                                        </p:tgtEl>
+                                        <p:attrNameLst>
+                                          <p:attrName>ppt_y</p:attrName>
+                                        </p:attrNameLst>
+                                      </p:cBhvr>
+                                      <p:tavLst>
+                                        <p:tav tm="0">
+                                          <p:val>
+                                            <p:strVal val="1+#ppt_h/2"/>
+                                          </p:val>
+                                        </p:tav>
+                                        <p:tav tm="100000">
+                                          <p:val>
+                                            <p:strVal val="#ppt_y"/>
+                                          </p:val>
+                                        </p:tav>
+                                      </p:tavLst>
+                                    </p:anim>
+                                  </p:childTnLst>
+                                </p:cTn>
+                              </p:par>
+                            </p:childTnLst>
+                          </p:cTn>
+                        </p:par>
+                      </p:childTnLst>
+                    </p:cTn>
+                  </p:par>
+                  <p:par>
+                    <p:cTn id="15" fill="hold">
+                      <p:stCondLst>
+                        <p:cond delay="indefinite"/>
+                      </p:stCondLst>
+                      <p:childTnLst>
+                        <p:par>
+                          <p:cTn id="16" fill="hold">
+                            <p:stCondLst>
+                              <p:cond delay="0"/>
+                            </p:stCondLst>
+                            <p:childTnLst>
+                              <p:par>
+                                <p:cTn id="17" presetID="2" presetClass="entr" presetSubtype="4" fill="hold" nodeType="clickEffect">
+                                  <p:stCondLst>
+                                    <p:cond delay="0"/>
+                                  </p:stCondLst>
+                                  <p:childTnLst>
+                                    <p:set>
+                                      <p:cBhvr>
+                                        <p:cTn id="18" dur="1" fill="hold">
+                                          <p:stCondLst>
+                                            <p:cond delay="0"/>
+                                          </p:stCondLst>
+                                        </p:cTn>
+                                        <p:tgtEl>
+                                          <p:spTgt spid="411651">
+                                            <p:txEl>
+                                              <p:pRg st="2" end="2"/>
+                                            </p:txEl>
+                                          </p:spTgt>
+                                        </p:tgtEl>
+                                        <p:attrNameLst>
+                                          <p:attrName>style.visibility</p:attrName>
+                                        </p:attrNameLst>
+                                      </p:cBhvr>
+                                      <p:to>
+                                        <p:strVal val="visible"/>
+                                      </p:to>
+                                    </p:set>
+                                    <p:anim calcmode="lin" valueType="num">
+                                      <p:cBhvr additive="base">
+                                        <p:cTn id="19" dur="500" fill="hold"/>
+                                        <p:tgtEl>
+                                          <p:spTgt spid="411651">
+                                            <p:txEl>
+                                              <p:pRg st="2" end="2"/>
+                                            </p:txEl>
+                                          </p:spTgt>
+                                        </p:tgtEl>
+                                        <p:attrNameLst>
+                                          <p:attrName>ppt_x</p:attrName>
+                                        </p:attrNameLst>
+                                      </p:cBhvr>
+                                      <p:tavLst>
+                                        <p:tav tm="0">
+                                          <p:val>
+                                            <p:strVal val="#ppt_x"/>
+                                          </p:val>
+                                        </p:tav>
+                                        <p:tav tm="100000">
+                                          <p:val>
+                                            <p:strVal val="#ppt_x"/>
+                                          </p:val>
+                                        </p:tav>
+                                      </p:tavLst>
+                                    </p:anim>
+                                    <p:anim calcmode="lin" valueType="num">
+                                      <p:cBhvr additive="base">
+                                        <p:cTn id="20" dur="500" fill="hold"/>
+                                        <p:tgtEl>
+                                          <p:spTgt spid="411651">
+                                            <p:txEl>
+                                              <p:pRg st="2" end="2"/>
+                                            </p:txEl>
+                                          </p:spTgt>
+                                        </p:tgtEl>
+                                        <p:attrNameLst>
+                                          <p:attrName>ppt_y</p:attrName>
+                                        </p:attrNameLst>
+                                      </p:cBhvr>
+                                      <p:tavLst>
+                                        <p:tav tm="0">
+                                          <p:val>
+                                            <p:strVal val="1+#ppt_h/2"/>
+                                          </p:val>
+                                        </p:tav>
+                                        <p:tav tm="100000">
+                                          <p:val>
+                                            <p:strVal val="#ppt_y"/>
+                                          </p:val>
+                                        </p:tav>
+                                      </p:tavLst>
+                                    </p:anim>
+                                  </p:childTnLst>
+                                </p:cTn>
+                              </p:par>
+                            </p:childTnLst>
+                          </p:cTn>
+                        </p:par>
+                      </p:childTnLst>
+                    </p:cTn>
+                  </p:par>
+                  <p:par>
+                    <p:cTn id="21" fill="hold">
+                      <p:stCondLst>
+                        <p:cond delay="indefinite"/>
+                      </p:stCondLst>
+                      <p:childTnLst>
+                        <p:par>
+                          <p:cTn id="22" fill="hold">
+                            <p:stCondLst>
+                              <p:cond delay="0"/>
+                            </p:stCondLst>
+                            <p:childTnLst>
+                              <p:par>
+                                <p:cTn id="23" presetID="2" presetClass="entr" presetSubtype="4" fill="hold" nodeType="clickEffect">
+                                  <p:stCondLst>
+                                    <p:cond delay="0"/>
+                                  </p:stCondLst>
+                                  <p:childTnLst>
+                                    <p:set>
+                                      <p:cBhvr>
+                                        <p:cTn id="24" dur="1" fill="hold">
+                                          <p:stCondLst>
+                                            <p:cond delay="0"/>
+                                          </p:stCondLst>
+                                        </p:cTn>
+                                        <p:tgtEl>
+                                          <p:spTgt spid="411651">
+                                            <p:txEl>
+                                              <p:pRg st="4" end="4"/>
+                                            </p:txEl>
+                                          </p:spTgt>
+                                        </p:tgtEl>
+                                        <p:attrNameLst>
+                                          <p:attrName>style.visibility</p:attrName>
+                                        </p:attrNameLst>
+                                      </p:cBhvr>
+                                      <p:to>
+                                        <p:strVal val="visible"/>
+                                      </p:to>
+                                    </p:set>
+                                    <p:anim calcmode="lin" valueType="num">
+                                      <p:cBhvr additive="base">
+                                        <p:cTn id="25" dur="500" fill="hold"/>
+                                        <p:tgtEl>
+                                          <p:spTgt spid="411651">
+                                            <p:txEl>
+                                              <p:pRg st="4" end="4"/>
+                                            </p:txEl>
+                                          </p:spTgt>
+                                        </p:tgtEl>
+                                        <p:attrNameLst>
+                                          <p:attrName>ppt_x</p:attrName>
+                                        </p:attrNameLst>
+                                      </p:cBhvr>
+                                      <p:tavLst>
+                                        <p:tav tm="0">
+                                          <p:val>
+                                            <p:strVal val="#ppt_x"/>
+                                          </p:val>
+                                        </p:tav>
+                                        <p:tav tm="100000">
+                                          <p:val>
+                                            <p:strVal val="#ppt_x"/>
+                                          </p:val>
+                                        </p:tav>
+                                      </p:tavLst>
+                                    </p:anim>
+                                    <p:anim calcmode="lin" valueType="num">
+                                      <p:cBhvr additive="base">
+                                        <p:cTn id="26" dur="500" fill="hold"/>
+                                        <p:tgtEl>
+                                          <p:spTgt spid="411651">
+                                            <p:txEl>
+                                              <p:pRg st="4" end="4"/>
+                                            </p:txEl>
+                                          </p:spTgt>
+                                        </p:tgtEl>
+                                        <p:attrNameLst>
+                                          <p:attrName>ppt_y</p:attrName>
+                                        </p:attrNameLst>
+                                      </p:cBhvr>
+                                      <p:tavLst>
+                                        <p:tav tm="0">
+                                          <p:val>
+                                            <p:strVal val="1+#ppt_h/2"/>
+                                          </p:val>
+                                        </p:tav>
+                                        <p:tav tm="100000">
+                                          <p:val>
+                                            <p:strVal val="#ppt_y"/>
+                                          </p:val>
+                                        </p:tav>
+                                      </p:tavLst>
+                                    </p:anim>
+                                  </p:childTnLst>
+                                </p:cTn>
+                              </p:par>
+                              <p:par>
+                                <p:cTn id="27" presetID="2" presetClass="entr" presetSubtype="4" fill="hold" nodeType="withEffect">
+                                  <p:stCondLst>
+                                    <p:cond delay="0"/>
+                                  </p:stCondLst>
+                                  <p:childTnLst>
+                                    <p:set>
+                                      <p:cBhvr>
+                                        <p:cTn id="28" dur="1" fill="hold">
+                                          <p:stCondLst>
+                                            <p:cond delay="0"/>
+                                          </p:stCondLst>
+                                        </p:cTn>
+                                        <p:tgtEl>
+                                          <p:spTgt spid="411651">
+                                            <p:txEl>
+                                              <p:pRg st="3" end="3"/>
+                                            </p:txEl>
+                                          </p:spTgt>
+                                        </p:tgtEl>
+                                        <p:attrNameLst>
+                                          <p:attrName>style.visibility</p:attrName>
+                                        </p:attrNameLst>
+                                      </p:cBhvr>
+                                      <p:to>
+                                        <p:strVal val="visible"/>
+                                      </p:to>
+                                    </p:set>
+                                    <p:anim calcmode="lin" valueType="num">
+                                      <p:cBhvr additive="base">
+                                        <p:cTn id="29" dur="500" fill="hold"/>
+                                        <p:tgtEl>
+                                          <p:spTgt spid="411651">
+                                            <p:txEl>
+                                              <p:pRg st="3" end="3"/>
+                                            </p:txEl>
+                                          </p:spTgt>
+                                        </p:tgtEl>
+                                        <p:attrNameLst>
+                                          <p:attrName>ppt_x</p:attrName>
+                                        </p:attrNameLst>
+                                      </p:cBhvr>
+                                      <p:tavLst>
+                                        <p:tav tm="0">
+                                          <p:val>
+                                            <p:strVal val="#ppt_x"/>
+                                          </p:val>
+                                        </p:tav>
+                                        <p:tav tm="100000">
+                                          <p:val>
+                                            <p:strVal val="#ppt_x"/>
+                                          </p:val>
+                                        </p:tav>
+                                      </p:tavLst>
+                                    </p:anim>
+                                    <p:anim calcmode="lin" valueType="num">
+                                      <p:cBhvr additive="base">
+                                        <p:cTn id="30" dur="500" fill="hold"/>
+                                        <p:tgtEl>
+                                          <p:spTgt spid="411651">
+                                            <p:txEl>
+                                              <p:pRg st="3" end="3"/>
+                                            </p:txEl>
+                                          </p:spTgt>
+                                        </p:tgtEl>
+                                        <p:attrNameLst>
+                                          <p:attrName>ppt_y</p:attrName>
+                                        </p:attrNameLst>
+                                      </p:cBhvr>
+                                      <p:tavLst>
+                                        <p:tav tm="0">
+                                          <p:val>
+                                            <p:strVal val="1+#ppt_h/2"/>
+                                          </p:val>
+                                        </p:tav>
+                                        <p:tav tm="100000">
+                                          <p:val>
+                                            <p:strVal val="#ppt_y"/>
+                                          </p:val>
+                                        </p:tav>
+                                      </p:tavLst>
+                                    </p:anim>
+                                  </p:childTnLst>
+                                </p:cTn>
+                              </p:par>
+                            </p:childTnLst>
+                          </p:cTn>
+                        </p:par>
+                      </p:childTnLst>
+                    </p:cTn>
+                  </p:par>
+                </p:childTnLst>
+              </p:cTn>
+              <p:prevCondLst>
+                <p:cond evt="onPrev" delay="0">
+                  <p:tgtEl>
+                    <p:sldTgt/>
+                  </p:tgtEl>
+                </p:cond>
+              </p:prevCondLst>
+              <p:nextCondLst>
+                <p:cond evt="onNext" delay="0">
+                  <p:tgtEl>
+                    <p:sldTgt/>
+                  </p:tgtEl>
+                </p:cond>
+              </p:nextCondLst>
+            </p:seq>
+          </p:childTnLst>
+        </p:cTn>
+      </p:par>
+    </p:tnLst>
   </p:timing>
 </p:sld>
 </file>

</xml_diff>

<commit_message>
new slides for OOP
</commit_message>
<xml_diff>
--- a/ClassMaterials/GrammarsAndLanguages/GrammarsAndLanguages.pptx
+++ b/ClassMaterials/GrammarsAndLanguages/GrammarsAndLanguages.pptx
@@ -5,10 +5,10 @@
     <p:sldMasterId id="2147483695" r:id="rId1"/>
   </p:sldMasterIdLst>
   <p:notesMasterIdLst>
-    <p:notesMasterId r:id="rId12"/>
+    <p:notesMasterId r:id="rId9"/>
   </p:notesMasterIdLst>
   <p:handoutMasterIdLst>
-    <p:handoutMasterId r:id="rId13"/>
+    <p:handoutMasterId r:id="rId10"/>
   </p:handoutMasterIdLst>
   <p:sldIdLst>
     <p:sldId id="257" r:id="rId2"/>
@@ -17,10 +17,7 @@
     <p:sldId id="364" r:id="rId5"/>
     <p:sldId id="390" r:id="rId6"/>
     <p:sldId id="394" r:id="rId7"/>
-    <p:sldId id="391" r:id="rId8"/>
-    <p:sldId id="365" r:id="rId9"/>
-    <p:sldId id="366" r:id="rId10"/>
-    <p:sldId id="367" r:id="rId11"/>
+    <p:sldId id="365" r:id="rId8"/>
   </p:sldIdLst>
   <p:sldSz cx="12192000" cy="6858000"/>
   <p:notesSz cx="7315200" cy="9601200"/>
@@ -1243,191 +1240,6 @@
     <p:extLst>
       <p:ext uri="{BB962C8B-B14F-4D97-AF65-F5344CB8AC3E}">
         <p14:creationId xmlns:p14="http://schemas.microsoft.com/office/powerpoint/2010/main" val="3963228950"/>
-      </p:ext>
-    </p:extLst>
-  </p:cSld>
-  <p:clrMapOvr>
-    <a:masterClrMapping/>
-  </p:clrMapOvr>
-</p:notes>
-</file>
-
-<file path=ppt/notesSlides/notesSlide5.xml><?xml version="1.0" encoding="utf-8"?>
-<p:notes xmlns:a="http://schemas.openxmlformats.org/drawingml/2006/main" xmlns:r="http://schemas.openxmlformats.org/officeDocument/2006/relationships" xmlns:p="http://schemas.openxmlformats.org/presentationml/2006/main">
-  <p:cSld>
-    <p:spTree>
-      <p:nvGrpSpPr>
-        <p:cNvPr id="1" name=""/>
-        <p:cNvGrpSpPr/>
-        <p:nvPr/>
-      </p:nvGrpSpPr>
-      <p:grpSpPr>
-        <a:xfrm>
-          <a:off x="0" y="0"/>
-          <a:ext cx="0" cy="0"/>
-          <a:chOff x="0" y="0"/>
-          <a:chExt cx="0" cy="0"/>
-        </a:xfrm>
-      </p:grpSpPr>
-      <p:sp>
-        <p:nvSpPr>
-          <p:cNvPr id="2" name="Slide Image Placeholder 1"/>
-          <p:cNvSpPr>
-            <a:spLocks noGrp="1" noRot="1" noChangeAspect="1"/>
-          </p:cNvSpPr>
-          <p:nvPr>
-            <p:ph type="sldImg"/>
-          </p:nvPr>
-        </p:nvSpPr>
-        <p:spPr>
-          <a:xfrm>
-            <a:off x="457200" y="719138"/>
-            <a:ext cx="6400800" cy="3602037"/>
-          </a:xfrm>
-        </p:spPr>
-      </p:sp>
-      <p:sp>
-        <p:nvSpPr>
-          <p:cNvPr id="3" name="Notes Placeholder 2"/>
-          <p:cNvSpPr>
-            <a:spLocks noGrp="1"/>
-          </p:cNvSpPr>
-          <p:nvPr>
-            <p:ph type="body" idx="1"/>
-          </p:nvPr>
-        </p:nvSpPr>
-        <p:spPr/>
-        <p:txBody>
-          <a:bodyPr/>
-          <a:lstStyle/>
-          <a:p>
-            <a:endParaRPr lang="en-US" dirty="0"/>
-          </a:p>
-        </p:txBody>
-      </p:sp>
-      <p:sp>
-        <p:nvSpPr>
-          <p:cNvPr id="4" name="Slide Number Placeholder 3"/>
-          <p:cNvSpPr>
-            <a:spLocks noGrp="1"/>
-          </p:cNvSpPr>
-          <p:nvPr>
-            <p:ph type="sldNum" sz="quarter" idx="10"/>
-          </p:nvPr>
-        </p:nvSpPr>
-        <p:spPr/>
-        <p:txBody>
-          <a:bodyPr/>
-          <a:lstStyle/>
-          <a:p>
-            <a:fld id="{D2B72A2D-1FB5-4235-BD2A-A47C126380AE}" type="slidenum">
-              <a:rPr lang="en-US" smtClean="0"/>
-              <a:pPr/>
-              <a:t>7</a:t>
-            </a:fld>
-            <a:endParaRPr lang="en-US"/>
-          </a:p>
-        </p:txBody>
-      </p:sp>
-    </p:spTree>
-    <p:extLst>
-      <p:ext uri="{BB962C8B-B14F-4D97-AF65-F5344CB8AC3E}">
-        <p14:creationId xmlns:p14="http://schemas.microsoft.com/office/powerpoint/2010/main" val="1287406110"/>
-      </p:ext>
-    </p:extLst>
-  </p:cSld>
-  <p:clrMapOvr>
-    <a:masterClrMapping/>
-  </p:clrMapOvr>
-</p:notes>
-</file>
-
-<file path=ppt/notesSlides/notesSlide6.xml><?xml version="1.0" encoding="utf-8"?>
-<p:notes xmlns:a="http://schemas.openxmlformats.org/drawingml/2006/main" xmlns:r="http://schemas.openxmlformats.org/officeDocument/2006/relationships" xmlns:p="http://schemas.openxmlformats.org/presentationml/2006/main">
-  <p:cSld>
-    <p:spTree>
-      <p:nvGrpSpPr>
-        <p:cNvPr id="1" name=""/>
-        <p:cNvGrpSpPr/>
-        <p:nvPr/>
-      </p:nvGrpSpPr>
-      <p:grpSpPr>
-        <a:xfrm>
-          <a:off x="0" y="0"/>
-          <a:ext cx="0" cy="0"/>
-          <a:chOff x="0" y="0"/>
-          <a:chExt cx="0" cy="0"/>
-        </a:xfrm>
-      </p:grpSpPr>
-      <p:sp>
-        <p:nvSpPr>
-          <p:cNvPr id="2" name="Slide Image Placeholder 1"/>
-          <p:cNvSpPr>
-            <a:spLocks noGrp="1" noRot="1" noChangeAspect="1"/>
-          </p:cNvSpPr>
-          <p:nvPr>
-            <p:ph type="sldImg"/>
-          </p:nvPr>
-        </p:nvSpPr>
-        <p:spPr>
-          <a:xfrm>
-            <a:off x="457200" y="719138"/>
-            <a:ext cx="6400800" cy="3602037"/>
-          </a:xfrm>
-        </p:spPr>
-      </p:sp>
-      <p:sp>
-        <p:nvSpPr>
-          <p:cNvPr id="3" name="Notes Placeholder 2"/>
-          <p:cNvSpPr>
-            <a:spLocks noGrp="1"/>
-          </p:cNvSpPr>
-          <p:nvPr>
-            <p:ph type="body" idx="1"/>
-          </p:nvPr>
-        </p:nvSpPr>
-        <p:spPr/>
-        <p:txBody>
-          <a:bodyPr>
-            <a:normAutofit/>
-          </a:bodyPr>
-          <a:lstStyle/>
-          <a:p>
-            <a:r>
-              <a:rPr lang="en-US" dirty="0"/>
-              <a:t>Write down some examples</a:t>
-            </a:r>
-          </a:p>
-        </p:txBody>
-      </p:sp>
-      <p:sp>
-        <p:nvSpPr>
-          <p:cNvPr id="4" name="Slide Number Placeholder 3"/>
-          <p:cNvSpPr>
-            <a:spLocks noGrp="1"/>
-          </p:cNvSpPr>
-          <p:nvPr>
-            <p:ph type="sldNum" sz="quarter" idx="10"/>
-          </p:nvPr>
-        </p:nvSpPr>
-        <p:spPr/>
-        <p:txBody>
-          <a:bodyPr/>
-          <a:lstStyle/>
-          <a:p>
-            <a:fld id="{D2B72A2D-1FB5-4235-BD2A-A47C126380AE}" type="slidenum">
-              <a:rPr lang="en-US" smtClean="0"/>
-              <a:pPr/>
-              <a:t>9</a:t>
-            </a:fld>
-            <a:endParaRPr lang="en-US"/>
-          </a:p>
-        </p:txBody>
-      </p:sp>
-    </p:spTree>
-    <p:extLst>
-      <p:ext uri="{BB962C8B-B14F-4D97-AF65-F5344CB8AC3E}">
-        <p14:creationId xmlns:p14="http://schemas.microsoft.com/office/powerpoint/2010/main" val="3455863188"/>
       </p:ext>
     </p:extLst>
   </p:cSld>
@@ -6803,227 +6615,6 @@
 </p:sld>
 </file>
 
-<file path=ppt/slides/slide10.xml><?xml version="1.0" encoding="utf-8"?>
-<p:sld xmlns:a="http://schemas.openxmlformats.org/drawingml/2006/main" xmlns:r="http://schemas.openxmlformats.org/officeDocument/2006/relationships" xmlns:p="http://schemas.openxmlformats.org/presentationml/2006/main">
-  <p:cSld>
-    <p:spTree>
-      <p:nvGrpSpPr>
-        <p:cNvPr id="1" name=""/>
-        <p:cNvGrpSpPr/>
-        <p:nvPr/>
-      </p:nvGrpSpPr>
-      <p:grpSpPr>
-        <a:xfrm>
-          <a:off x="0" y="0"/>
-          <a:ext cx="0" cy="0"/>
-          <a:chOff x="0" y="0"/>
-          <a:chExt cx="0" cy="0"/>
-        </a:xfrm>
-      </p:grpSpPr>
-      <p:sp>
-        <p:nvSpPr>
-          <p:cNvPr id="413698" name="Rectangle 2"/>
-          <p:cNvSpPr>
-            <a:spLocks noGrp="1" noChangeArrowheads="1"/>
-          </p:cNvSpPr>
-          <p:nvPr>
-            <p:ph type="title"/>
-          </p:nvPr>
-        </p:nvSpPr>
-        <p:spPr>
-          <a:xfrm>
-            <a:off x="1981200" y="1"/>
-            <a:ext cx="8229600" cy="1139825"/>
-          </a:xfrm>
-        </p:spPr>
-        <p:txBody>
-          <a:bodyPr/>
-          <a:lstStyle/>
-          <a:p>
-            <a:r>
-              <a:rPr lang="en-US" sz="4000" dirty="0"/>
-              <a:t>Grammars for some languages used in EoPL  (continued)</a:t>
-            </a:r>
-          </a:p>
-        </p:txBody>
-      </p:sp>
-      <p:sp>
-        <p:nvSpPr>
-          <p:cNvPr id="413699" name="Rectangle 3"/>
-          <p:cNvSpPr>
-            <a:spLocks noGrp="1" noChangeArrowheads="1"/>
-          </p:cNvSpPr>
-          <p:nvPr>
-            <p:ph type="body" idx="1"/>
-          </p:nvPr>
-        </p:nvSpPr>
-        <p:spPr>
-          <a:xfrm>
-            <a:off x="1524000" y="1295400"/>
-            <a:ext cx="9144000" cy="5410200"/>
-          </a:xfrm>
-        </p:spPr>
-        <p:txBody>
-          <a:bodyPr/>
-          <a:lstStyle/>
-          <a:p>
-            <a:pPr>
-              <a:spcAft>
-                <a:spcPts val="1800"/>
-              </a:spcAft>
-            </a:pPr>
-            <a:r>
-              <a:rPr lang="en-US" dirty="0"/>
-              <a:t>&lt;datum&gt; ::= &lt;number&gt; | &lt;symbol&gt;     | </a:t>
-            </a:r>
-            <a:br>
-              <a:rPr lang="en-US" dirty="0"/>
-            </a:br>
-            <a:r>
-              <a:rPr lang="en-US" dirty="0"/>
-              <a:t>                     &lt;string&gt;    | &lt;</a:t>
-            </a:r>
-            <a:r>
-              <a:rPr lang="en-US" dirty="0" err="1"/>
-              <a:t>boolean</a:t>
-            </a:r>
-            <a:r>
-              <a:rPr lang="en-US" dirty="0"/>
-              <a:t>&gt;   |</a:t>
-            </a:r>
-            <a:br>
-              <a:rPr lang="en-US" dirty="0"/>
-            </a:br>
-            <a:r>
-              <a:rPr lang="en-US" dirty="0"/>
-              <a:t>                     &lt;dotted-datum&gt; | &lt;list&gt;  |      </a:t>
-            </a:r>
-            <a:br>
-              <a:rPr lang="en-US" dirty="0"/>
-            </a:br>
-            <a:r>
-              <a:rPr lang="en-US" dirty="0"/>
-              <a:t>                     &lt;vector&gt;</a:t>
-            </a:r>
-            <a:br>
-              <a:rPr lang="en-US" dirty="0"/>
-            </a:br>
-            <a:r>
-              <a:rPr lang="en-US" dirty="0"/>
-              <a:t>&lt;list&gt;                  ::= ( {&lt;datum&gt;}* )</a:t>
-            </a:r>
-            <a:br>
-              <a:rPr lang="en-US" dirty="0"/>
-            </a:br>
-            <a:r>
-              <a:rPr lang="en-US" dirty="0"/>
-              <a:t>&lt;dotted-datum&gt; ::= ( {&lt;datum&gt;}</a:t>
-            </a:r>
-            <a:r>
-              <a:rPr lang="en-US" baseline="30000" dirty="0"/>
-              <a:t>+</a:t>
-            </a:r>
-            <a:r>
-              <a:rPr lang="en-US" dirty="0"/>
-              <a:t> . &lt;datum&gt; )</a:t>
-            </a:r>
-            <a:br>
-              <a:rPr lang="en-US" dirty="0"/>
-            </a:br>
-            <a:r>
-              <a:rPr lang="en-US" dirty="0"/>
-              <a:t>&lt;vector&gt;             ::=  # &lt;list&gt;</a:t>
-            </a:r>
-          </a:p>
-          <a:p>
-            <a:pPr>
-              <a:spcAft>
-                <a:spcPts val="1800"/>
-              </a:spcAft>
-            </a:pPr>
-            <a:r>
-              <a:rPr lang="en-US" dirty="0"/>
-              <a:t>&lt;</a:t>
-            </a:r>
-            <a:r>
-              <a:rPr lang="en-US" dirty="0" err="1"/>
-              <a:t>LcExp</a:t>
-            </a:r>
-            <a:r>
-              <a:rPr lang="en-US" dirty="0"/>
-              <a:t>&gt;   ::= Identifier   |</a:t>
-            </a:r>
-            <a:br>
-              <a:rPr lang="en-US" dirty="0"/>
-            </a:br>
-            <a:r>
-              <a:rPr lang="en-US" dirty="0"/>
-              <a:t>                      (lambda (Identifier) &lt;</a:t>
-            </a:r>
-            <a:r>
-              <a:rPr lang="en-US" dirty="0" err="1"/>
-              <a:t>LcExp</a:t>
-            </a:r>
-            <a:r>
-              <a:rPr lang="en-US" dirty="0"/>
-              <a:t>&gt;)  |</a:t>
-            </a:r>
-            <a:br>
-              <a:rPr lang="en-US" dirty="0"/>
-            </a:br>
-            <a:r>
-              <a:rPr lang="en-US" dirty="0"/>
-              <a:t>                      (&lt;</a:t>
-            </a:r>
-            <a:r>
-              <a:rPr lang="en-US" dirty="0" err="1"/>
-              <a:t>LcExp</a:t>
-            </a:r>
-            <a:r>
-              <a:rPr lang="en-US" dirty="0"/>
-              <a:t>&gt; &lt;</a:t>
-            </a:r>
-            <a:r>
-              <a:rPr lang="en-US" dirty="0" err="1"/>
-              <a:t>LcExp</a:t>
-            </a:r>
-            <a:r>
-              <a:rPr lang="en-US" dirty="0"/>
-              <a:t>&gt;) </a:t>
-            </a:r>
-            <a:br>
-              <a:rPr lang="en-US" dirty="0"/>
-            </a:br>
-            <a:r>
-              <a:rPr lang="en-US" dirty="0"/>
-              <a:t>                        </a:t>
-            </a:r>
-          </a:p>
-          <a:p>
-            <a:pPr>
-              <a:lnSpc>
-                <a:spcPct val="80000"/>
-              </a:lnSpc>
-              <a:buFont typeface="Wingdings" pitchFamily="2" charset="2"/>
-              <a:buNone/>
-            </a:pPr>
-            <a:endParaRPr lang="en-US" sz="3400" dirty="0"/>
-          </a:p>
-        </p:txBody>
-      </p:sp>
-    </p:spTree>
-    <p:extLst>
-      <p:ext uri="{BB962C8B-B14F-4D97-AF65-F5344CB8AC3E}">
-        <p14:creationId xmlns:p14="http://schemas.microsoft.com/office/powerpoint/2010/main" val="581521608"/>
-      </p:ext>
-    </p:extLst>
-  </p:cSld>
-  <p:clrMapOvr>
-    <a:masterClrMapping/>
-  </p:clrMapOvr>
-</p:sld>
-</file>
-
 <file path=ppt/slides/slide2.xml><?xml version="1.0" encoding="utf-8"?>
 <p:sld xmlns:a="http://schemas.openxmlformats.org/drawingml/2006/main" xmlns:r="http://schemas.openxmlformats.org/officeDocument/2006/relationships" xmlns:p="http://schemas.openxmlformats.org/presentationml/2006/main">
   <p:cSld>
@@ -7303,7 +6894,7 @@
             </a:pPr>
             <a:r>
               <a:rPr lang="en-US" dirty="0"/>
-              <a:t>&lt;noun phrase&gt; ::= &lt;adjective&gt; &lt;noun&gt;</a:t>
+              <a:t>&lt;noun phrase&gt; ::= &lt;adjective&gt; &lt;noun phrase&gt; | &lt;noun&gt;</a:t>
             </a:r>
           </a:p>
           <a:p>
@@ -9125,1129 +8716,6 @@
 </file>
 
 <file path=ppt/slides/slide7.xml><?xml version="1.0" encoding="utf-8"?>
-<p:sld xmlns:a="http://schemas.openxmlformats.org/drawingml/2006/main" xmlns:r="http://schemas.openxmlformats.org/officeDocument/2006/relationships" xmlns:p="http://schemas.openxmlformats.org/presentationml/2006/main" showMasterPhAnim="0">
-  <p:cSld>
-    <p:spTree>
-      <p:nvGrpSpPr>
-        <p:cNvPr id="1" name=""/>
-        <p:cNvGrpSpPr/>
-        <p:nvPr/>
-      </p:nvGrpSpPr>
-      <p:grpSpPr>
-        <a:xfrm>
-          <a:off x="0" y="0"/>
-          <a:ext cx="0" cy="0"/>
-          <a:chOff x="0" y="0"/>
-          <a:chExt cx="0" cy="0"/>
-        </a:xfrm>
-      </p:grpSpPr>
-      <p:sp>
-        <p:nvSpPr>
-          <p:cNvPr id="442370" name="Rectangle 2"/>
-          <p:cNvSpPr>
-            <a:spLocks noGrp="1" noChangeArrowheads="1"/>
-          </p:cNvSpPr>
-          <p:nvPr>
-            <p:ph type="title"/>
-          </p:nvPr>
-        </p:nvSpPr>
-        <p:spPr>
-          <a:xfrm>
-            <a:off x="1981200" y="277814"/>
-            <a:ext cx="8229600" cy="911225"/>
-          </a:xfrm>
-        </p:spPr>
-        <p:txBody>
-          <a:bodyPr/>
-          <a:lstStyle/>
-          <a:p>
-            <a:r>
-              <a:rPr lang="en-US" sz="4000" dirty="0"/>
-              <a:t>BNF: recursive </a:t>
-            </a:r>
-            <a:r>
-              <a:rPr lang="en-US" sz="4000"/>
-              <a:t>syntax specification</a:t>
-            </a:r>
-            <a:endParaRPr lang="en-US" sz="4000" dirty="0"/>
-          </a:p>
-        </p:txBody>
-      </p:sp>
-      <p:sp>
-        <p:nvSpPr>
-          <p:cNvPr id="442371" name="Rectangle 3"/>
-          <p:cNvSpPr>
-            <a:spLocks noGrp="1" noChangeArrowheads="1"/>
-          </p:cNvSpPr>
-          <p:nvPr>
-            <p:ph type="body" idx="1"/>
-          </p:nvPr>
-        </p:nvSpPr>
-        <p:spPr>
-          <a:xfrm>
-            <a:off x="1905000" y="1219200"/>
-            <a:ext cx="8229600" cy="4724400"/>
-          </a:xfrm>
-        </p:spPr>
-        <p:txBody>
-          <a:bodyPr/>
-          <a:lstStyle/>
-          <a:p>
-            <a:pPr>
-              <a:lnSpc>
-                <a:spcPct val="80000"/>
-              </a:lnSpc>
-            </a:pPr>
-            <a:r>
-              <a:rPr lang="en-US" dirty="0"/>
-              <a:t>Backus-Naur Form.  </a:t>
-            </a:r>
-            <a:r>
-              <a:rPr lang="en-US" sz="2400" dirty="0"/>
-              <a:t>Specify  the syntax of a language.  a.k.a. context-free grammar (CFG)</a:t>
-            </a:r>
-          </a:p>
-          <a:p>
-            <a:pPr>
-              <a:lnSpc>
-                <a:spcPct val="80000"/>
-              </a:lnSpc>
-            </a:pPr>
-            <a:r>
-              <a:rPr lang="en-US" sz="2400" b="1" dirty="0"/>
-              <a:t>Example:</a:t>
-            </a:r>
-            <a:r>
-              <a:rPr lang="en-US" sz="2400" dirty="0"/>
-              <a:t>  </a:t>
-            </a:r>
-            <a:br>
-              <a:rPr lang="en-US" sz="2400" dirty="0"/>
-            </a:br>
-            <a:endParaRPr lang="en-US" sz="2400" dirty="0"/>
-          </a:p>
-          <a:p>
-            <a:pPr lvl="1">
-              <a:lnSpc>
-                <a:spcPct val="80000"/>
-              </a:lnSpc>
-            </a:pPr>
-            <a:r>
-              <a:rPr lang="en-US" sz="2000" b="1" dirty="0" err="1">
-                <a:solidFill>
-                  <a:schemeClr val="folHlink"/>
-                </a:solidFill>
-                <a:effectLst>
-                  <a:outerShdw blurRad="38100" dist="38100" dir="2700000" algn="tl">
-                    <a:srgbClr val="FFFFFF"/>
-                  </a:outerShdw>
-                </a:effectLst>
-              </a:rPr>
-              <a:t>Nonterminals</a:t>
-            </a:r>
-            <a:r>
-              <a:rPr lang="en-US" sz="2000" b="1" dirty="0"/>
-              <a:t>:</a:t>
-            </a:r>
-            <a:r>
-              <a:rPr lang="en-US" sz="2000" dirty="0"/>
-              <a:t>  &lt;exp&gt;  &lt;term&gt; &lt;factor&gt; &lt;number&gt; &lt;digit&gt;</a:t>
-            </a:r>
-          </a:p>
-          <a:p>
-            <a:pPr lvl="1">
-              <a:lnSpc>
-                <a:spcPct val="80000"/>
-              </a:lnSpc>
-            </a:pPr>
-            <a:r>
-              <a:rPr lang="en-US" sz="2000" b="1" dirty="0">
-                <a:solidFill>
-                  <a:schemeClr val="folHlink"/>
-                </a:solidFill>
-                <a:effectLst>
-                  <a:outerShdw blurRad="38100" dist="38100" dir="2700000" algn="tl">
-                    <a:srgbClr val="FFFFFF"/>
-                  </a:outerShdw>
-                </a:effectLst>
-              </a:rPr>
-              <a:t>Terminals</a:t>
-            </a:r>
-            <a:r>
-              <a:rPr lang="en-US" sz="2000" b="1" dirty="0"/>
-              <a:t>: </a:t>
-            </a:r>
-            <a:r>
-              <a:rPr lang="en-US" sz="2000" dirty="0"/>
-              <a:t>    +    *    )    (    0    1    2    3    4    5    6    7    8    9</a:t>
-            </a:r>
-          </a:p>
-          <a:p>
-            <a:pPr lvl="1">
-              <a:lnSpc>
-                <a:spcPct val="80000"/>
-              </a:lnSpc>
-            </a:pPr>
-            <a:r>
-              <a:rPr lang="en-US" sz="2000" b="1" dirty="0">
-                <a:solidFill>
-                  <a:schemeClr val="folHlink"/>
-                </a:solidFill>
-                <a:effectLst>
-                  <a:outerShdw blurRad="38100" dist="38100" dir="2700000" algn="tl">
-                    <a:srgbClr val="FFFFFF"/>
-                  </a:outerShdw>
-                </a:effectLst>
-              </a:rPr>
-              <a:t>Productions</a:t>
-            </a:r>
-            <a:r>
-              <a:rPr lang="en-US" sz="2000" b="1" dirty="0"/>
-              <a:t>:</a:t>
-            </a:r>
-            <a:r>
-              <a:rPr lang="en-US" sz="2000" dirty="0"/>
-              <a:t>  </a:t>
-            </a:r>
-          </a:p>
-          <a:p>
-            <a:pPr lvl="2">
-              <a:lnSpc>
-                <a:spcPct val="80000"/>
-              </a:lnSpc>
-              <a:buFont typeface="Wingdings" pitchFamily="2" charset="2"/>
-              <a:buNone/>
-            </a:pPr>
-            <a:r>
-              <a:rPr lang="en-US" sz="1800" b="1" dirty="0">
-                <a:latin typeface="Courier New" pitchFamily="49" charset="0"/>
-              </a:rPr>
-              <a:t>&lt;exp&gt;    ::= &lt;exp&gt; + &lt;term&gt;  |  &lt;term&gt;</a:t>
-            </a:r>
-          </a:p>
-          <a:p>
-            <a:pPr lvl="2">
-              <a:lnSpc>
-                <a:spcPct val="80000"/>
-              </a:lnSpc>
-              <a:buFont typeface="Wingdings" pitchFamily="2" charset="2"/>
-              <a:buNone/>
-            </a:pPr>
-            <a:r>
-              <a:rPr lang="en-US" sz="1800" b="1" dirty="0">
-                <a:latin typeface="Courier New" pitchFamily="49" charset="0"/>
-              </a:rPr>
-              <a:t>&lt;term&gt;   ::= &lt;term&gt; * &lt;factor&gt; | &lt;factor&gt;</a:t>
-            </a:r>
-          </a:p>
-          <a:p>
-            <a:pPr lvl="2">
-              <a:lnSpc>
-                <a:spcPct val="80000"/>
-              </a:lnSpc>
-              <a:buFont typeface="Wingdings" pitchFamily="2" charset="2"/>
-              <a:buNone/>
-            </a:pPr>
-            <a:r>
-              <a:rPr lang="en-US" sz="1800" b="1" dirty="0">
-                <a:latin typeface="Courier New" pitchFamily="49" charset="0"/>
-              </a:rPr>
-              <a:t>&lt;factor&gt; ::= ( &lt;exp&gt; )  | &lt;number&gt;</a:t>
-            </a:r>
-          </a:p>
-          <a:p>
-            <a:pPr lvl="2">
-              <a:lnSpc>
-                <a:spcPct val="80000"/>
-              </a:lnSpc>
-              <a:buFont typeface="Wingdings" pitchFamily="2" charset="2"/>
-              <a:buNone/>
-            </a:pPr>
-            <a:r>
-              <a:rPr lang="en-US" sz="1800" b="1" dirty="0">
-                <a:latin typeface="Courier New" pitchFamily="49" charset="0"/>
-              </a:rPr>
-              <a:t>&lt;number&gt; ::= &lt;number&gt; &lt;digit&gt;   | &lt;digit&gt;</a:t>
-            </a:r>
-          </a:p>
-          <a:p>
-            <a:pPr lvl="2">
-              <a:lnSpc>
-                <a:spcPct val="80000"/>
-              </a:lnSpc>
-              <a:buFont typeface="Wingdings" pitchFamily="2" charset="2"/>
-              <a:buNone/>
-            </a:pPr>
-            <a:r>
-              <a:rPr lang="en-US" sz="1800" b="1" dirty="0">
-                <a:latin typeface="Courier New" pitchFamily="49" charset="0"/>
-              </a:rPr>
-              <a:t>&lt;digit&gt;  ::= 0 | 1 | 2 | 3 | 4 | 5 | 6 | 7 | 8 | 9</a:t>
-            </a:r>
-          </a:p>
-          <a:p>
-            <a:pPr>
-              <a:lnSpc>
-                <a:spcPct val="80000"/>
-              </a:lnSpc>
-            </a:pPr>
-            <a:r>
-              <a:rPr lang="en-US" sz="2400" dirty="0"/>
-              <a:t>Derive    </a:t>
-            </a:r>
-            <a:r>
-              <a:rPr lang="en-US" sz="2400" dirty="0">
-                <a:latin typeface="Courier New" pitchFamily="49" charset="0"/>
-              </a:rPr>
-              <a:t>1 * (2 + 34)</a:t>
-            </a:r>
-            <a:r>
-              <a:rPr lang="en-US" sz="2400" dirty="0"/>
-              <a:t>by showing  a derivation tree.</a:t>
-            </a:r>
-            <a:br>
-              <a:rPr lang="en-US" sz="2400" dirty="0"/>
-            </a:br>
-            <a:endParaRPr lang="en-US" sz="2400" dirty="0"/>
-          </a:p>
-        </p:txBody>
-      </p:sp>
-      <p:grpSp>
-        <p:nvGrpSpPr>
-          <p:cNvPr id="442372" name="Group 4"/>
-          <p:cNvGrpSpPr>
-            <a:grpSpLocks/>
-          </p:cNvGrpSpPr>
-          <p:nvPr/>
-        </p:nvGrpSpPr>
-        <p:grpSpPr bwMode="auto">
-          <a:xfrm>
-            <a:off x="2819400" y="1828800"/>
-            <a:ext cx="7467600" cy="2057400"/>
-            <a:chOff x="816" y="1152"/>
-            <a:chExt cx="4704" cy="1296"/>
-          </a:xfrm>
-        </p:grpSpPr>
-        <p:sp>
-          <p:nvSpPr>
-            <p:cNvPr id="442373" name="Text Box 5"/>
-            <p:cNvSpPr txBox="1">
-              <a:spLocks noChangeArrowheads="1"/>
-            </p:cNvSpPr>
-            <p:nvPr/>
-          </p:nvSpPr>
-          <p:spPr bwMode="auto">
-            <a:xfrm>
-              <a:off x="4032" y="1152"/>
-              <a:ext cx="1488" cy="288"/>
-            </a:xfrm>
-            <a:prstGeom prst="rect">
-              <a:avLst/>
-            </a:prstGeom>
-            <a:noFill/>
-            <a:ln w="9525">
-              <a:noFill/>
-              <a:miter lim="800000"/>
-              <a:headEnd/>
-              <a:tailEnd/>
-            </a:ln>
-            <a:effectLst/>
-          </p:spPr>
-          <p:txBody>
-            <a:bodyPr>
-              <a:spAutoFit/>
-            </a:bodyPr>
-            <a:lstStyle/>
-            <a:p>
-              <a:pPr>
-                <a:spcBef>
-                  <a:spcPct val="50000"/>
-                </a:spcBef>
-              </a:pPr>
-              <a:r>
-                <a:rPr lang="en-US" sz="2400" b="1">
-                  <a:solidFill>
-                    <a:schemeClr val="folHlink"/>
-                  </a:solidFill>
-                </a:rPr>
-                <a:t>Start Symbol</a:t>
-              </a:r>
-            </a:p>
-          </p:txBody>
-        </p:sp>
-        <p:sp>
-          <p:nvSpPr>
-            <p:cNvPr id="442374" name="Oval 6"/>
-            <p:cNvSpPr>
-              <a:spLocks noChangeArrowheads="1"/>
-            </p:cNvSpPr>
-            <p:nvPr/>
-          </p:nvSpPr>
-          <p:spPr bwMode="auto">
-            <a:xfrm>
-              <a:off x="816" y="2208"/>
-              <a:ext cx="528" cy="240"/>
-            </a:xfrm>
-            <a:prstGeom prst="ellipse">
-              <a:avLst/>
-            </a:prstGeom>
-            <a:noFill/>
-            <a:ln w="38100">
-              <a:solidFill>
-                <a:schemeClr val="folHlink"/>
-              </a:solidFill>
-              <a:round/>
-              <a:headEnd/>
-              <a:tailEnd/>
-            </a:ln>
-            <a:effectLst/>
-          </p:spPr>
-          <p:txBody>
-            <a:bodyPr wrap="none" anchor="ctr"/>
-            <a:lstStyle/>
-            <a:p>
-              <a:endParaRPr lang="en-US"/>
-            </a:p>
-          </p:txBody>
-        </p:sp>
-        <p:sp>
-          <p:nvSpPr>
-            <p:cNvPr id="442375" name="Line 7"/>
-            <p:cNvSpPr>
-              <a:spLocks noChangeShapeType="1"/>
-            </p:cNvSpPr>
-            <p:nvPr/>
-          </p:nvSpPr>
-          <p:spPr bwMode="auto">
-            <a:xfrm flipH="1">
-              <a:off x="1344" y="1344"/>
-              <a:ext cx="2736" cy="960"/>
-            </a:xfrm>
-            <a:prstGeom prst="line">
-              <a:avLst/>
-            </a:prstGeom>
-            <a:noFill/>
-            <a:ln w="38100">
-              <a:solidFill>
-                <a:schemeClr val="folHlink"/>
-              </a:solidFill>
-              <a:round/>
-              <a:headEnd/>
-              <a:tailEnd type="triangle" w="med" len="med"/>
-            </a:ln>
-            <a:effectLst/>
-          </p:spPr>
-          <p:txBody>
-            <a:bodyPr/>
-            <a:lstStyle/>
-            <a:p>
-              <a:endParaRPr lang="en-US"/>
-            </a:p>
-          </p:txBody>
-        </p:sp>
-      </p:grpSp>
-      <p:sp>
-        <p:nvSpPr>
-          <p:cNvPr id="442376" name="Rectangle 8"/>
-          <p:cNvSpPr>
-            <a:spLocks noChangeArrowheads="1"/>
-          </p:cNvSpPr>
-          <p:nvPr/>
-        </p:nvSpPr>
-        <p:spPr bwMode="auto">
-          <a:xfrm>
-            <a:off x="2286000" y="2590800"/>
-            <a:ext cx="7772400" cy="2286000"/>
-          </a:xfrm>
-          <a:prstGeom prst="rect">
-            <a:avLst/>
-          </a:prstGeom>
-          <a:noFill/>
-          <a:ln w="41275">
-            <a:solidFill>
-              <a:srgbClr val="FF0000"/>
-            </a:solidFill>
-            <a:miter lim="800000"/>
-            <a:headEnd/>
-            <a:tailEnd/>
-          </a:ln>
-          <a:effectLst/>
-        </p:spPr>
-        <p:txBody>
-          <a:bodyPr wrap="none" anchor="ctr"/>
-          <a:lstStyle/>
-          <a:p>
-            <a:endParaRPr lang="en-US"/>
-          </a:p>
-        </p:txBody>
-      </p:sp>
-      <p:sp>
-        <p:nvSpPr>
-          <p:cNvPr id="442377" name="Text Box 9"/>
-          <p:cNvSpPr txBox="1">
-            <a:spLocks noChangeArrowheads="1"/>
-          </p:cNvSpPr>
-          <p:nvPr/>
-        </p:nvSpPr>
-        <p:spPr bwMode="auto">
-          <a:xfrm>
-            <a:off x="9144000" y="5705475"/>
-            <a:ext cx="1600200" cy="457200"/>
-          </a:xfrm>
-          <a:prstGeom prst="rect">
-            <a:avLst/>
-          </a:prstGeom>
-          <a:noFill/>
-          <a:ln w="9525">
-            <a:noFill/>
-            <a:miter lim="800000"/>
-            <a:headEnd/>
-            <a:tailEnd/>
-          </a:ln>
-          <a:effectLst/>
-        </p:spPr>
-        <p:txBody>
-          <a:bodyPr>
-            <a:spAutoFit/>
-          </a:bodyPr>
-          <a:lstStyle/>
-          <a:p>
-            <a:pPr>
-              <a:spcBef>
-                <a:spcPct val="50000"/>
-              </a:spcBef>
-            </a:pPr>
-            <a:r>
-              <a:rPr lang="en-US" sz="2400" b="1">
-                <a:solidFill>
-                  <a:srgbClr val="FF3300"/>
-                </a:solidFill>
-              </a:rPr>
-              <a:t>Grammar</a:t>
-            </a:r>
-          </a:p>
-        </p:txBody>
-      </p:sp>
-      <p:sp>
-        <p:nvSpPr>
-          <p:cNvPr id="442378" name="Line 10"/>
-          <p:cNvSpPr>
-            <a:spLocks noChangeShapeType="1"/>
-          </p:cNvSpPr>
-          <p:nvPr/>
-        </p:nvSpPr>
-        <p:spPr bwMode="auto">
-          <a:xfrm flipH="1" flipV="1">
-            <a:off x="9829800" y="4906962"/>
-            <a:ext cx="152400" cy="954088"/>
-          </a:xfrm>
-          <a:prstGeom prst="line">
-            <a:avLst/>
-          </a:prstGeom>
-          <a:noFill/>
-          <a:ln w="47625">
-            <a:solidFill>
-              <a:srgbClr val="FF0000"/>
-            </a:solidFill>
-            <a:round/>
-            <a:headEnd/>
-            <a:tailEnd type="triangle" w="med" len="med"/>
-          </a:ln>
-          <a:effectLst/>
-        </p:spPr>
-        <p:txBody>
-          <a:bodyPr/>
-          <a:lstStyle/>
-          <a:p>
-            <a:endParaRPr lang="en-US"/>
-          </a:p>
-        </p:txBody>
-      </p:sp>
-      <p:sp>
-        <p:nvSpPr>
-          <p:cNvPr id="442379" name="Text Box 11"/>
-          <p:cNvSpPr txBox="1">
-            <a:spLocks noChangeArrowheads="1"/>
-          </p:cNvSpPr>
-          <p:nvPr/>
-        </p:nvSpPr>
-        <p:spPr bwMode="auto">
-          <a:xfrm>
-            <a:off x="1676400" y="5410201"/>
-            <a:ext cx="7315200" cy="1222375"/>
-          </a:xfrm>
-          <a:prstGeom prst="rect">
-            <a:avLst/>
-          </a:prstGeom>
-          <a:solidFill>
-            <a:schemeClr val="bg1"/>
-          </a:solidFill>
-          <a:ln w="34925">
-            <a:solidFill>
-              <a:schemeClr val="tx1"/>
-            </a:solidFill>
-            <a:miter lim="800000"/>
-            <a:headEnd/>
-            <a:tailEnd/>
-          </a:ln>
-          <a:effectLst/>
-        </p:spPr>
-        <p:txBody>
-          <a:bodyPr>
-            <a:spAutoFit/>
-          </a:bodyPr>
-          <a:lstStyle/>
-          <a:p>
-            <a:pPr>
-              <a:spcBef>
-                <a:spcPct val="50000"/>
-              </a:spcBef>
-            </a:pPr>
-            <a:r>
-              <a:rPr lang="en-US" sz="2400" dirty="0"/>
-              <a:t>The </a:t>
-            </a:r>
-            <a:r>
-              <a:rPr lang="en-US" sz="2400" b="1" dirty="0">
-                <a:solidFill>
-                  <a:schemeClr val="folHlink"/>
-                </a:solidFill>
-              </a:rPr>
-              <a:t>language</a:t>
-            </a:r>
-            <a:r>
-              <a:rPr lang="en-US" sz="2400" dirty="0"/>
-              <a:t> of this grammar is the set of all strings of terminals that can be derived from the start symbol.  3 + 2 is in the language; 2 * + 7 is not</a:t>
-            </a:r>
-          </a:p>
-        </p:txBody>
-      </p:sp>
-    </p:spTree>
-    <p:extLst>
-      <p:ext uri="{BB962C8B-B14F-4D97-AF65-F5344CB8AC3E}">
-        <p14:creationId xmlns:p14="http://schemas.microsoft.com/office/powerpoint/2010/main" val="1477034110"/>
-      </p:ext>
-    </p:extLst>
-  </p:cSld>
-  <p:clrMapOvr>
-    <a:masterClrMapping/>
-  </p:clrMapOvr>
-  <p:timing>
-    <p:tnLst>
-      <p:par>
-        <p:cTn id="1" dur="indefinite" restart="never" nodeType="tmRoot">
-          <p:childTnLst>
-            <p:seq concurrent="1" nextAc="seek">
-              <p:cTn id="2" dur="indefinite" nodeType="mainSeq">
-                <p:childTnLst>
-                  <p:par>
-                    <p:cTn id="3" fill="hold">
-                      <p:stCondLst>
-                        <p:cond delay="indefinite"/>
-                        <p:cond evt="onBegin" delay="0">
-                          <p:tn val="2"/>
-                        </p:cond>
-                      </p:stCondLst>
-                      <p:childTnLst>
-                        <p:par>
-                          <p:cTn id="4" fill="hold">
-                            <p:stCondLst>
-                              <p:cond delay="0"/>
-                            </p:stCondLst>
-                            <p:childTnLst>
-                              <p:par>
-                                <p:cTn id="5" presetID="1" presetClass="entr" presetSubtype="0" fill="hold" grpId="0" nodeType="withEffect">
-                                  <p:stCondLst>
-                                    <p:cond delay="0"/>
-                                  </p:stCondLst>
-                                  <p:childTnLst>
-                                    <p:set>
-                                      <p:cBhvr>
-                                        <p:cTn id="6" dur="1" fill="hold">
-                                          <p:stCondLst>
-                                            <p:cond delay="0"/>
-                                          </p:stCondLst>
-                                        </p:cTn>
-                                        <p:tgtEl>
-                                          <p:spTgt spid="442371">
-                                            <p:txEl>
-                                              <p:pRg st="0" end="0"/>
-                                            </p:txEl>
-                                          </p:spTgt>
-                                        </p:tgtEl>
-                                        <p:attrNameLst>
-                                          <p:attrName>style.visibility</p:attrName>
-                                        </p:attrNameLst>
-                                      </p:cBhvr>
-                                      <p:to>
-                                        <p:strVal val="visible"/>
-                                      </p:to>
-                                    </p:set>
-                                  </p:childTnLst>
-                                </p:cTn>
-                              </p:par>
-                            </p:childTnLst>
-                          </p:cTn>
-                        </p:par>
-                      </p:childTnLst>
-                    </p:cTn>
-                  </p:par>
-                  <p:par>
-                    <p:cTn id="7" fill="hold">
-                      <p:stCondLst>
-                        <p:cond delay="indefinite"/>
-                      </p:stCondLst>
-                      <p:childTnLst>
-                        <p:par>
-                          <p:cTn id="8" fill="hold">
-                            <p:stCondLst>
-                              <p:cond delay="0"/>
-                            </p:stCondLst>
-                            <p:childTnLst>
-                              <p:par>
-                                <p:cTn id="9" presetID="1" presetClass="entr" presetSubtype="0" fill="hold" grpId="0" nodeType="clickEffect">
-                                  <p:stCondLst>
-                                    <p:cond delay="0"/>
-                                  </p:stCondLst>
-                                  <p:childTnLst>
-                                    <p:set>
-                                      <p:cBhvr>
-                                        <p:cTn id="10" dur="1" fill="hold">
-                                          <p:stCondLst>
-                                            <p:cond delay="0"/>
-                                          </p:stCondLst>
-                                        </p:cTn>
-                                        <p:tgtEl>
-                                          <p:spTgt spid="442371">
-                                            <p:txEl>
-                                              <p:pRg st="1" end="1"/>
-                                            </p:txEl>
-                                          </p:spTgt>
-                                        </p:tgtEl>
-                                        <p:attrNameLst>
-                                          <p:attrName>style.visibility</p:attrName>
-                                        </p:attrNameLst>
-                                      </p:cBhvr>
-                                      <p:to>
-                                        <p:strVal val="visible"/>
-                                      </p:to>
-                                    </p:set>
-                                  </p:childTnLst>
-                                </p:cTn>
-                              </p:par>
-                              <p:par>
-                                <p:cTn id="11" presetID="1" presetClass="entr" presetSubtype="0" fill="hold" grpId="0" nodeType="withEffect">
-                                  <p:stCondLst>
-                                    <p:cond delay="0"/>
-                                  </p:stCondLst>
-                                  <p:childTnLst>
-                                    <p:set>
-                                      <p:cBhvr>
-                                        <p:cTn id="12" dur="1" fill="hold">
-                                          <p:stCondLst>
-                                            <p:cond delay="0"/>
-                                          </p:stCondLst>
-                                        </p:cTn>
-                                        <p:tgtEl>
-                                          <p:spTgt spid="442371">
-                                            <p:txEl>
-                                              <p:pRg st="2" end="2"/>
-                                            </p:txEl>
-                                          </p:spTgt>
-                                        </p:tgtEl>
-                                        <p:attrNameLst>
-                                          <p:attrName>style.visibility</p:attrName>
-                                        </p:attrNameLst>
-                                      </p:cBhvr>
-                                      <p:to>
-                                        <p:strVal val="visible"/>
-                                      </p:to>
-                                    </p:set>
-                                  </p:childTnLst>
-                                </p:cTn>
-                              </p:par>
-                              <p:par>
-                                <p:cTn id="13" presetID="1" presetClass="entr" presetSubtype="0" fill="hold" grpId="0" nodeType="withEffect">
-                                  <p:stCondLst>
-                                    <p:cond delay="0"/>
-                                  </p:stCondLst>
-                                  <p:childTnLst>
-                                    <p:set>
-                                      <p:cBhvr>
-                                        <p:cTn id="14" dur="1" fill="hold">
-                                          <p:stCondLst>
-                                            <p:cond delay="0"/>
-                                          </p:stCondLst>
-                                        </p:cTn>
-                                        <p:tgtEl>
-                                          <p:spTgt spid="442371">
-                                            <p:txEl>
-                                              <p:pRg st="3" end="3"/>
-                                            </p:txEl>
-                                          </p:spTgt>
-                                        </p:tgtEl>
-                                        <p:attrNameLst>
-                                          <p:attrName>style.visibility</p:attrName>
-                                        </p:attrNameLst>
-                                      </p:cBhvr>
-                                      <p:to>
-                                        <p:strVal val="visible"/>
-                                      </p:to>
-                                    </p:set>
-                                  </p:childTnLst>
-                                </p:cTn>
-                              </p:par>
-                              <p:par>
-                                <p:cTn id="15" presetID="1" presetClass="entr" presetSubtype="0" fill="hold" grpId="0" nodeType="withEffect">
-                                  <p:stCondLst>
-                                    <p:cond delay="0"/>
-                                  </p:stCondLst>
-                                  <p:childTnLst>
-                                    <p:set>
-                                      <p:cBhvr>
-                                        <p:cTn id="16" dur="1" fill="hold">
-                                          <p:stCondLst>
-                                            <p:cond delay="0"/>
-                                          </p:stCondLst>
-                                        </p:cTn>
-                                        <p:tgtEl>
-                                          <p:spTgt spid="442371">
-                                            <p:txEl>
-                                              <p:pRg st="4" end="4"/>
-                                            </p:txEl>
-                                          </p:spTgt>
-                                        </p:tgtEl>
-                                        <p:attrNameLst>
-                                          <p:attrName>style.visibility</p:attrName>
-                                        </p:attrNameLst>
-                                      </p:cBhvr>
-                                      <p:to>
-                                        <p:strVal val="visible"/>
-                                      </p:to>
-                                    </p:set>
-                                  </p:childTnLst>
-                                </p:cTn>
-                              </p:par>
-                              <p:par>
-                                <p:cTn id="17" presetID="1" presetClass="entr" presetSubtype="0" fill="hold" grpId="0" nodeType="withEffect">
-                                  <p:stCondLst>
-                                    <p:cond delay="0"/>
-                                  </p:stCondLst>
-                                  <p:childTnLst>
-                                    <p:set>
-                                      <p:cBhvr>
-                                        <p:cTn id="18" dur="1" fill="hold">
-                                          <p:stCondLst>
-                                            <p:cond delay="0"/>
-                                          </p:stCondLst>
-                                        </p:cTn>
-                                        <p:tgtEl>
-                                          <p:spTgt spid="442371">
-                                            <p:txEl>
-                                              <p:pRg st="5" end="5"/>
-                                            </p:txEl>
-                                          </p:spTgt>
-                                        </p:tgtEl>
-                                        <p:attrNameLst>
-                                          <p:attrName>style.visibility</p:attrName>
-                                        </p:attrNameLst>
-                                      </p:cBhvr>
-                                      <p:to>
-                                        <p:strVal val="visible"/>
-                                      </p:to>
-                                    </p:set>
-                                  </p:childTnLst>
-                                </p:cTn>
-                              </p:par>
-                              <p:par>
-                                <p:cTn id="19" presetID="1" presetClass="entr" presetSubtype="0" fill="hold" grpId="0" nodeType="withEffect">
-                                  <p:stCondLst>
-                                    <p:cond delay="0"/>
-                                  </p:stCondLst>
-                                  <p:childTnLst>
-                                    <p:set>
-                                      <p:cBhvr>
-                                        <p:cTn id="20" dur="1" fill="hold">
-                                          <p:stCondLst>
-                                            <p:cond delay="0"/>
-                                          </p:stCondLst>
-                                        </p:cTn>
-                                        <p:tgtEl>
-                                          <p:spTgt spid="442371">
-                                            <p:txEl>
-                                              <p:pRg st="6" end="6"/>
-                                            </p:txEl>
-                                          </p:spTgt>
-                                        </p:tgtEl>
-                                        <p:attrNameLst>
-                                          <p:attrName>style.visibility</p:attrName>
-                                        </p:attrNameLst>
-                                      </p:cBhvr>
-                                      <p:to>
-                                        <p:strVal val="visible"/>
-                                      </p:to>
-                                    </p:set>
-                                  </p:childTnLst>
-                                </p:cTn>
-                              </p:par>
-                              <p:par>
-                                <p:cTn id="21" presetID="1" presetClass="entr" presetSubtype="0" fill="hold" grpId="0" nodeType="withEffect">
-                                  <p:stCondLst>
-                                    <p:cond delay="0"/>
-                                  </p:stCondLst>
-                                  <p:childTnLst>
-                                    <p:set>
-                                      <p:cBhvr>
-                                        <p:cTn id="22" dur="1" fill="hold">
-                                          <p:stCondLst>
-                                            <p:cond delay="0"/>
-                                          </p:stCondLst>
-                                        </p:cTn>
-                                        <p:tgtEl>
-                                          <p:spTgt spid="442371">
-                                            <p:txEl>
-                                              <p:pRg st="7" end="7"/>
-                                            </p:txEl>
-                                          </p:spTgt>
-                                        </p:tgtEl>
-                                        <p:attrNameLst>
-                                          <p:attrName>style.visibility</p:attrName>
-                                        </p:attrNameLst>
-                                      </p:cBhvr>
-                                      <p:to>
-                                        <p:strVal val="visible"/>
-                                      </p:to>
-                                    </p:set>
-                                  </p:childTnLst>
-                                </p:cTn>
-                              </p:par>
-                              <p:par>
-                                <p:cTn id="23" presetID="1" presetClass="entr" presetSubtype="0" fill="hold" grpId="0" nodeType="withEffect">
-                                  <p:stCondLst>
-                                    <p:cond delay="0"/>
-                                  </p:stCondLst>
-                                  <p:childTnLst>
-                                    <p:set>
-                                      <p:cBhvr>
-                                        <p:cTn id="24" dur="1" fill="hold">
-                                          <p:stCondLst>
-                                            <p:cond delay="0"/>
-                                          </p:stCondLst>
-                                        </p:cTn>
-                                        <p:tgtEl>
-                                          <p:spTgt spid="442371">
-                                            <p:txEl>
-                                              <p:pRg st="8" end="8"/>
-                                            </p:txEl>
-                                          </p:spTgt>
-                                        </p:tgtEl>
-                                        <p:attrNameLst>
-                                          <p:attrName>style.visibility</p:attrName>
-                                        </p:attrNameLst>
-                                      </p:cBhvr>
-                                      <p:to>
-                                        <p:strVal val="visible"/>
-                                      </p:to>
-                                    </p:set>
-                                  </p:childTnLst>
-                                </p:cTn>
-                              </p:par>
-                              <p:par>
-                                <p:cTn id="25" presetID="1" presetClass="entr" presetSubtype="0" fill="hold" grpId="0" nodeType="withEffect">
-                                  <p:stCondLst>
-                                    <p:cond delay="0"/>
-                                  </p:stCondLst>
-                                  <p:childTnLst>
-                                    <p:set>
-                                      <p:cBhvr>
-                                        <p:cTn id="26" dur="1" fill="hold">
-                                          <p:stCondLst>
-                                            <p:cond delay="0"/>
-                                          </p:stCondLst>
-                                        </p:cTn>
-                                        <p:tgtEl>
-                                          <p:spTgt spid="442371">
-                                            <p:txEl>
-                                              <p:pRg st="9" end="9"/>
-                                            </p:txEl>
-                                          </p:spTgt>
-                                        </p:tgtEl>
-                                        <p:attrNameLst>
-                                          <p:attrName>style.visibility</p:attrName>
-                                        </p:attrNameLst>
-                                      </p:cBhvr>
-                                      <p:to>
-                                        <p:strVal val="visible"/>
-                                      </p:to>
-                                    </p:set>
-                                  </p:childTnLst>
-                                </p:cTn>
-                              </p:par>
-                              <p:par>
-                                <p:cTn id="27" presetID="9" presetClass="entr" presetSubtype="0" fill="hold" nodeType="withEffect">
-                                  <p:stCondLst>
-                                    <p:cond delay="0"/>
-                                  </p:stCondLst>
-                                  <p:childTnLst>
-                                    <p:set>
-                                      <p:cBhvr>
-                                        <p:cTn id="28" dur="1" fill="hold">
-                                          <p:stCondLst>
-                                            <p:cond delay="0"/>
-                                          </p:stCondLst>
-                                        </p:cTn>
-                                        <p:tgtEl>
-                                          <p:spTgt spid="442372"/>
-                                        </p:tgtEl>
-                                        <p:attrNameLst>
-                                          <p:attrName>style.visibility</p:attrName>
-                                        </p:attrNameLst>
-                                      </p:cBhvr>
-                                      <p:to>
-                                        <p:strVal val="visible"/>
-                                      </p:to>
-                                    </p:set>
-                                    <p:animEffect transition="in" filter="dissolve">
-                                      <p:cBhvr>
-                                        <p:cTn id="29" dur="500"/>
-                                        <p:tgtEl>
-                                          <p:spTgt spid="442372"/>
-                                        </p:tgtEl>
-                                      </p:cBhvr>
-                                    </p:animEffect>
-                                  </p:childTnLst>
-                                </p:cTn>
-                              </p:par>
-                            </p:childTnLst>
-                          </p:cTn>
-                        </p:par>
-                      </p:childTnLst>
-                    </p:cTn>
-                  </p:par>
-                  <p:par>
-                    <p:cTn id="30" fill="hold">
-                      <p:stCondLst>
-                        <p:cond delay="indefinite"/>
-                      </p:stCondLst>
-                      <p:childTnLst>
-                        <p:par>
-                          <p:cTn id="31" fill="hold">
-                            <p:stCondLst>
-                              <p:cond delay="0"/>
-                            </p:stCondLst>
-                            <p:childTnLst>
-                              <p:par>
-                                <p:cTn id="32" presetID="1" presetClass="entr" presetSubtype="0" fill="hold" grpId="0" nodeType="clickEffect">
-                                  <p:stCondLst>
-                                    <p:cond delay="0"/>
-                                  </p:stCondLst>
-                                  <p:childTnLst>
-                                    <p:set>
-                                      <p:cBhvr>
-                                        <p:cTn id="33" dur="1" fill="hold">
-                                          <p:stCondLst>
-                                            <p:cond delay="0"/>
-                                          </p:stCondLst>
-                                        </p:cTn>
-                                        <p:tgtEl>
-                                          <p:spTgt spid="442371">
-                                            <p:txEl>
-                                              <p:pRg st="10" end="10"/>
-                                            </p:txEl>
-                                          </p:spTgt>
-                                        </p:tgtEl>
-                                        <p:attrNameLst>
-                                          <p:attrName>style.visibility</p:attrName>
-                                        </p:attrNameLst>
-                                      </p:cBhvr>
-                                      <p:to>
-                                        <p:strVal val="visible"/>
-                                      </p:to>
-                                    </p:set>
-                                  </p:childTnLst>
-                                </p:cTn>
-                              </p:par>
-                            </p:childTnLst>
-                          </p:cTn>
-                        </p:par>
-                      </p:childTnLst>
-                    </p:cTn>
-                  </p:par>
-                  <p:par>
-                    <p:cTn id="34" fill="hold">
-                      <p:stCondLst>
-                        <p:cond delay="indefinite"/>
-                      </p:stCondLst>
-                      <p:childTnLst>
-                        <p:par>
-                          <p:cTn id="35" fill="hold">
-                            <p:stCondLst>
-                              <p:cond delay="0"/>
-                            </p:stCondLst>
-                            <p:childTnLst>
-                              <p:par>
-                                <p:cTn id="36" presetID="1" presetClass="entr" presetSubtype="0" fill="hold" grpId="0" nodeType="clickEffect">
-                                  <p:stCondLst>
-                                    <p:cond delay="0"/>
-                                  </p:stCondLst>
-                                  <p:childTnLst>
-                                    <p:set>
-                                      <p:cBhvr>
-                                        <p:cTn id="37" dur="1" fill="hold">
-                                          <p:stCondLst>
-                                            <p:cond delay="0"/>
-                                          </p:stCondLst>
-                                        </p:cTn>
-                                        <p:tgtEl>
-                                          <p:spTgt spid="442379"/>
-                                        </p:tgtEl>
-                                        <p:attrNameLst>
-                                          <p:attrName>style.visibility</p:attrName>
-                                        </p:attrNameLst>
-                                      </p:cBhvr>
-                                      <p:to>
-                                        <p:strVal val="visible"/>
-                                      </p:to>
-                                    </p:set>
-                                  </p:childTnLst>
-                                </p:cTn>
-                              </p:par>
-                            </p:childTnLst>
-                          </p:cTn>
-                        </p:par>
-                      </p:childTnLst>
-                    </p:cTn>
-                  </p:par>
-                </p:childTnLst>
-              </p:cTn>
-              <p:prevCondLst>
-                <p:cond evt="onPrev" delay="0">
-                  <p:tgtEl>
-                    <p:sldTgt/>
-                  </p:tgtEl>
-                </p:cond>
-              </p:prevCondLst>
-              <p:nextCondLst>
-                <p:cond evt="onNext" delay="0">
-                  <p:tgtEl>
-                    <p:sldTgt/>
-                  </p:tgtEl>
-                </p:cond>
-              </p:nextCondLst>
-            </p:seq>
-          </p:childTnLst>
-        </p:cTn>
-      </p:par>
-    </p:tnLst>
-    <p:bldLst>
-      <p:bldP spid="442371" grpId="0" uiExpand="1" build="p"/>
-      <p:bldP spid="442379" grpId="0" animBg="1"/>
-    </p:bldLst>
-  </p:timing>
-</p:sld>
-</file>
-
-<file path=ppt/slides/slide8.xml><?xml version="1.0" encoding="utf-8"?>
 <p:sld xmlns:a="http://schemas.openxmlformats.org/drawingml/2006/main" xmlns:r="http://schemas.openxmlformats.org/officeDocument/2006/relationships" xmlns:p="http://schemas.openxmlformats.org/presentationml/2006/main">
   <p:cSld>
     <p:spTree>
@@ -10445,6 +8913,17 @@
             <a:r>
               <a:rPr lang="en-US" sz="2400" dirty="0"/>
               <a:t> certain numbers in scientific notation</a:t>
+            </a:r>
+          </a:p>
+          <a:p>
+            <a:pPr>
+              <a:lnSpc>
+                <a:spcPct val="90000"/>
+              </a:lnSpc>
+            </a:pPr>
+            <a:r>
+              <a:rPr lang="en-US" sz="2800" dirty="0"/>
+              <a:t>Solve the other side of your handout</a:t>
             </a:r>
           </a:p>
           <a:p>
@@ -10881,15 +9360,118 @@
                                   </p:childTnLst>
                                 </p:cTn>
                               </p:par>
+                            </p:childTnLst>
+                          </p:cTn>
+                        </p:par>
+                      </p:childTnLst>
+                    </p:cTn>
+                  </p:par>
+                  <p:par>
+                    <p:cTn id="27" fill="hold">
+                      <p:stCondLst>
+                        <p:cond delay="indefinite"/>
+                      </p:stCondLst>
+                      <p:childTnLst>
+                        <p:par>
+                          <p:cTn id="28" fill="hold">
+                            <p:stCondLst>
+                              <p:cond delay="0"/>
+                            </p:stCondLst>
+                            <p:childTnLst>
                               <p:par>
-                                <p:cTn id="27" presetID="2" presetClass="entr" presetSubtype="4" fill="hold" nodeType="withEffect">
+                                <p:cTn id="29" presetID="2" presetClass="entr" presetSubtype="4" fill="hold" nodeType="clickEffect">
                                   <p:stCondLst>
                                     <p:cond delay="0"/>
                                   </p:stCondLst>
                                   <p:childTnLst>
                                     <p:set>
                                       <p:cBhvr>
-                                        <p:cTn id="28" dur="1" fill="hold">
+                                        <p:cTn id="30" dur="1" fill="hold">
+                                          <p:stCondLst>
+                                            <p:cond delay="0"/>
+                                          </p:stCondLst>
+                                        </p:cTn>
+                                        <p:tgtEl>
+                                          <p:spTgt spid="411651">
+                                            <p:txEl>
+                                              <p:pRg st="5" end="5"/>
+                                            </p:txEl>
+                                          </p:spTgt>
+                                        </p:tgtEl>
+                                        <p:attrNameLst>
+                                          <p:attrName>style.visibility</p:attrName>
+                                        </p:attrNameLst>
+                                      </p:cBhvr>
+                                      <p:to>
+                                        <p:strVal val="visible"/>
+                                      </p:to>
+                                    </p:set>
+                                    <p:anim calcmode="lin" valueType="num">
+                                      <p:cBhvr additive="base">
+                                        <p:cTn id="31" dur="500" fill="hold"/>
+                                        <p:tgtEl>
+                                          <p:spTgt spid="411651">
+                                            <p:txEl>
+                                              <p:pRg st="5" end="5"/>
+                                            </p:txEl>
+                                          </p:spTgt>
+                                        </p:tgtEl>
+                                        <p:attrNameLst>
+                                          <p:attrName>ppt_x</p:attrName>
+                                        </p:attrNameLst>
+                                      </p:cBhvr>
+                                      <p:tavLst>
+                                        <p:tav tm="0">
+                                          <p:val>
+                                            <p:strVal val="#ppt_x"/>
+                                          </p:val>
+                                        </p:tav>
+                                        <p:tav tm="100000">
+                                          <p:val>
+                                            <p:strVal val="#ppt_x"/>
+                                          </p:val>
+                                        </p:tav>
+                                      </p:tavLst>
+                                    </p:anim>
+                                    <p:anim calcmode="lin" valueType="num">
+                                      <p:cBhvr additive="base">
+                                        <p:cTn id="32" dur="500" fill="hold"/>
+                                        <p:tgtEl>
+                                          <p:spTgt spid="411651">
+                                            <p:txEl>
+                                              <p:pRg st="5" end="5"/>
+                                            </p:txEl>
+                                          </p:spTgt>
+                                        </p:tgtEl>
+                                        <p:attrNameLst>
+                                          <p:attrName>ppt_y</p:attrName>
+                                        </p:attrNameLst>
+                                      </p:cBhvr>
+                                      <p:tavLst>
+                                        <p:tav tm="0">
+                                          <p:val>
+                                            <p:strVal val="1+#ppt_h/2"/>
+                                          </p:val>
+                                        </p:tav>
+                                        <p:tav tm="100000">
+                                          <p:val>
+                                            <p:strVal val="#ppt_y"/>
+                                          </p:val>
+                                        </p:tav>
+                                      </p:tavLst>
+                                    </p:anim>
+                                  </p:childTnLst>
+                                </p:cTn>
+                              </p:par>
+                              <p:par>
+                                <p:cTn id="33" presetID="2" presetClass="entr" presetSubtype="4" fill="hold" nodeType="withEffect">
+                                  <p:stCondLst>
+                                    <p:cond delay="0"/>
+                                  </p:stCondLst>
+                                  <p:childTnLst>
+                                    <p:set>
+                                      <p:cBhvr>
+                                        <p:cTn id="34" dur="1" fill="hold">
                                           <p:stCondLst>
                                             <p:cond delay="0"/>
                                           </p:stCondLst>
@@ -10911,7 +9493,7 @@
                                     </p:set>
                                     <p:anim calcmode="lin" valueType="num">
                                       <p:cBhvr additive="base">
-                                        <p:cTn id="29" dur="500" fill="hold"/>
+                                        <p:cTn id="35" dur="500" fill="hold"/>
                                         <p:tgtEl>
                                           <p:spTgt spid="411651">
                                             <p:txEl>
@@ -10938,7 +9520,7 @@
                                     </p:anim>
                                     <p:anim calcmode="lin" valueType="num">
                                       <p:cBhvr additive="base">
-                                        <p:cTn id="30" dur="500" fill="hold"/>
+                                        <p:cTn id="36" dur="500" fill="hold"/>
                                         <p:tgtEl>
                                           <p:spTgt spid="411651">
                                             <p:txEl>
@@ -10993,418 +9575,6 @@
         </p:cTn>
       </p:par>
     </p:tnLst>
-  </p:timing>
-</p:sld>
-</file>
-
-<file path=ppt/slides/slide9.xml><?xml version="1.0" encoding="utf-8"?>
-<p:sld xmlns:a="http://schemas.openxmlformats.org/drawingml/2006/main" xmlns:r="http://schemas.openxmlformats.org/officeDocument/2006/relationships" xmlns:p="http://schemas.openxmlformats.org/presentationml/2006/main" showMasterPhAnim="0">
-  <p:cSld>
-    <p:spTree>
-      <p:nvGrpSpPr>
-        <p:cNvPr id="1" name=""/>
-        <p:cNvGrpSpPr/>
-        <p:nvPr/>
-      </p:nvGrpSpPr>
-      <p:grpSpPr>
-        <a:xfrm>
-          <a:off x="0" y="0"/>
-          <a:ext cx="0" cy="0"/>
-          <a:chOff x="0" y="0"/>
-          <a:chExt cx="0" cy="0"/>
-        </a:xfrm>
-      </p:grpSpPr>
-      <p:sp>
-        <p:nvSpPr>
-          <p:cNvPr id="412674" name="Rectangle 2"/>
-          <p:cNvSpPr>
-            <a:spLocks noGrp="1" noChangeArrowheads="1"/>
-          </p:cNvSpPr>
-          <p:nvPr>
-            <p:ph type="title"/>
-          </p:nvPr>
-        </p:nvSpPr>
-        <p:spPr>
-          <a:xfrm>
-            <a:off x="1981200" y="152401"/>
-            <a:ext cx="8229600" cy="1139825"/>
-          </a:xfrm>
-        </p:spPr>
-        <p:txBody>
-          <a:bodyPr/>
-          <a:lstStyle/>
-          <a:p>
-            <a:r>
-              <a:rPr lang="en-US" sz="4000" dirty="0"/>
-              <a:t>Grammars for some languages used in EoPL and/or HW 7-9</a:t>
-            </a:r>
-          </a:p>
-        </p:txBody>
-      </p:sp>
-      <p:sp>
-        <p:nvSpPr>
-          <p:cNvPr id="412675" name="Rectangle 3"/>
-          <p:cNvSpPr>
-            <a:spLocks noGrp="1" noChangeArrowheads="1"/>
-          </p:cNvSpPr>
-          <p:nvPr>
-            <p:ph type="body" idx="1"/>
-          </p:nvPr>
-        </p:nvSpPr>
-        <p:spPr>
-          <a:xfrm>
-            <a:off x="1524000" y="1600200"/>
-            <a:ext cx="9144000" cy="4495800"/>
-          </a:xfrm>
-        </p:spPr>
-        <p:txBody>
-          <a:bodyPr/>
-          <a:lstStyle/>
-          <a:p>
-            <a:r>
-              <a:rPr lang="en-US" dirty="0"/>
-              <a:t>&lt;list-of-numbers&gt; ::= ( {&lt;number&gt;}* )</a:t>
-            </a:r>
-            <a:endParaRPr lang="en-US" dirty="0">
-              <a:solidFill>
-                <a:schemeClr val="folHlink"/>
-              </a:solidFill>
-              <a:effectLst>
-                <a:outerShdw blurRad="38100" dist="38100" dir="2700000" algn="tl">
-                  <a:srgbClr val="FFFFFF"/>
-                </a:outerShdw>
-              </a:effectLst>
-            </a:endParaRPr>
-          </a:p>
-          <a:p>
-            <a:endParaRPr lang="en-US" sz="2400" dirty="0">
-              <a:solidFill>
-                <a:schemeClr val="folHlink"/>
-              </a:solidFill>
-              <a:effectLst>
-                <a:outerShdw blurRad="38100" dist="38100" dir="2700000" algn="tl">
-                  <a:srgbClr val="FFFFFF"/>
-                </a:outerShdw>
-              </a:effectLst>
-            </a:endParaRPr>
-          </a:p>
-          <a:p>
-            <a:r>
-              <a:rPr lang="en-US" dirty="0"/>
-              <a:t>&lt;s-list&gt;             ::= ( {&lt;symbol-exp&gt;}* )</a:t>
-            </a:r>
-            <a:br>
-              <a:rPr lang="en-US" dirty="0"/>
-            </a:br>
-            <a:r>
-              <a:rPr lang="en-US" dirty="0"/>
-              <a:t>&lt;symbol-exp&gt;  ::= &lt;symbol&gt; | &lt;s-list&gt;    </a:t>
-            </a:r>
-          </a:p>
-          <a:p>
-            <a:endParaRPr lang="en-US" sz="2400" dirty="0"/>
-          </a:p>
-          <a:p>
-            <a:r>
-              <a:rPr lang="en-US" dirty="0"/>
-              <a:t>&lt;</a:t>
-            </a:r>
-            <a:r>
-              <a:rPr lang="en-US" dirty="0" err="1"/>
-              <a:t>bintree</a:t>
-            </a:r>
-            <a:r>
-              <a:rPr lang="en-US" dirty="0"/>
-              <a:t>&gt;   ::= &lt;number&gt; |</a:t>
-            </a:r>
-            <a:br>
-              <a:rPr lang="en-US" dirty="0"/>
-            </a:br>
-            <a:r>
-              <a:rPr lang="en-US" dirty="0"/>
-              <a:t>                       ( &lt;symbol&gt; &lt;</a:t>
-            </a:r>
-            <a:r>
-              <a:rPr lang="en-US" dirty="0" err="1"/>
-              <a:t>bintree</a:t>
-            </a:r>
-            <a:r>
-              <a:rPr lang="en-US" dirty="0"/>
-              <a:t>&gt; &lt;</a:t>
-            </a:r>
-            <a:r>
-              <a:rPr lang="en-US" dirty="0" err="1"/>
-              <a:t>bintree</a:t>
-            </a:r>
-            <a:r>
-              <a:rPr lang="en-US" dirty="0"/>
-              <a:t>&gt; )</a:t>
-            </a:r>
-            <a:br>
-              <a:rPr lang="en-US" dirty="0"/>
-            </a:br>
-            <a:endParaRPr lang="en-US" sz="2400" dirty="0"/>
-          </a:p>
-          <a:p>
-            <a:r>
-              <a:rPr lang="en-US" dirty="0"/>
-              <a:t>&lt;BST&gt; ::= ( ) |</a:t>
-            </a:r>
-            <a:br>
-              <a:rPr lang="en-US" dirty="0"/>
-            </a:br>
-            <a:r>
-              <a:rPr lang="en-US" dirty="0"/>
-              <a:t>                 (&lt;number&gt;  &lt;BST&gt; &lt;BST&gt; )</a:t>
-            </a:r>
-            <a:br>
-              <a:rPr lang="en-US" dirty="0"/>
-            </a:br>
-            <a:r>
-              <a:rPr lang="en-US" dirty="0"/>
-              <a:t>   </a:t>
-            </a:r>
-          </a:p>
-        </p:txBody>
-      </p:sp>
-    </p:spTree>
-    <p:extLst>
-      <p:ext uri="{BB962C8B-B14F-4D97-AF65-F5344CB8AC3E}">
-        <p14:creationId xmlns:p14="http://schemas.microsoft.com/office/powerpoint/2010/main" val="1074144456"/>
-      </p:ext>
-    </p:extLst>
-  </p:cSld>
-  <p:clrMapOvr>
-    <a:masterClrMapping/>
-  </p:clrMapOvr>
-  <p:timing>
-    <p:tnLst>
-      <p:par>
-        <p:cTn id="1" dur="indefinite" restart="never" nodeType="tmRoot">
-          <p:childTnLst>
-            <p:seq concurrent="1" nextAc="seek">
-              <p:cTn id="2" dur="indefinite" nodeType="mainSeq">
-                <p:childTnLst>
-                  <p:par>
-                    <p:cTn id="3" fill="hold">
-                      <p:stCondLst>
-                        <p:cond delay="indefinite"/>
-                      </p:stCondLst>
-                      <p:childTnLst>
-                        <p:par>
-                          <p:cTn id="4" fill="hold">
-                            <p:stCondLst>
-                              <p:cond delay="0"/>
-                            </p:stCondLst>
-                            <p:childTnLst>
-                              <p:par>
-                                <p:cTn id="5" presetID="1" presetClass="entr" presetSubtype="0" fill="hold" grpId="0" nodeType="clickEffect">
-                                  <p:stCondLst>
-                                    <p:cond delay="0"/>
-                                  </p:stCondLst>
-                                  <p:childTnLst>
-                                    <p:set>
-                                      <p:cBhvr>
-                                        <p:cTn id="6" dur="1" fill="hold">
-                                          <p:stCondLst>
-                                            <p:cond delay="0"/>
-                                          </p:stCondLst>
-                                        </p:cTn>
-                                        <p:tgtEl>
-                                          <p:spTgt spid="412675">
-                                            <p:txEl>
-                                              <p:pRg st="0" end="0"/>
-                                            </p:txEl>
-                                          </p:spTgt>
-                                        </p:tgtEl>
-                                        <p:attrNameLst>
-                                          <p:attrName>style.visibility</p:attrName>
-                                        </p:attrNameLst>
-                                      </p:cBhvr>
-                                      <p:to>
-                                        <p:strVal val="visible"/>
-                                      </p:to>
-                                    </p:set>
-                                  </p:childTnLst>
-                                </p:cTn>
-                              </p:par>
-                            </p:childTnLst>
-                          </p:cTn>
-                        </p:par>
-                      </p:childTnLst>
-                    </p:cTn>
-                  </p:par>
-                  <p:par>
-                    <p:cTn id="7" fill="hold">
-                      <p:stCondLst>
-                        <p:cond delay="indefinite"/>
-                      </p:stCondLst>
-                      <p:childTnLst>
-                        <p:par>
-                          <p:cTn id="8" fill="hold">
-                            <p:stCondLst>
-                              <p:cond delay="0"/>
-                            </p:stCondLst>
-                            <p:childTnLst>
-                              <p:par>
-                                <p:cTn id="9" presetID="1" presetClass="entr" presetSubtype="0" fill="hold" grpId="0" nodeType="clickEffect">
-                                  <p:stCondLst>
-                                    <p:cond delay="0"/>
-                                  </p:stCondLst>
-                                  <p:childTnLst>
-                                    <p:set>
-                                      <p:cBhvr>
-                                        <p:cTn id="10" dur="1" fill="hold">
-                                          <p:stCondLst>
-                                            <p:cond delay="0"/>
-                                          </p:stCondLst>
-                                        </p:cTn>
-                                        <p:tgtEl>
-                                          <p:spTgt spid="412675">
-                                            <p:txEl>
-                                              <p:pRg st="2" end="2"/>
-                                            </p:txEl>
-                                          </p:spTgt>
-                                        </p:tgtEl>
-                                        <p:attrNameLst>
-                                          <p:attrName>style.visibility</p:attrName>
-                                        </p:attrNameLst>
-                                      </p:cBhvr>
-                                      <p:to>
-                                        <p:strVal val="visible"/>
-                                      </p:to>
-                                    </p:set>
-                                  </p:childTnLst>
-                                </p:cTn>
-                              </p:par>
-                            </p:childTnLst>
-                          </p:cTn>
-                        </p:par>
-                      </p:childTnLst>
-                    </p:cTn>
-                  </p:par>
-                  <p:par>
-                    <p:cTn id="11" fill="hold">
-                      <p:stCondLst>
-                        <p:cond delay="indefinite"/>
-                      </p:stCondLst>
-                      <p:childTnLst>
-                        <p:par>
-                          <p:cTn id="12" fill="hold">
-                            <p:stCondLst>
-                              <p:cond delay="0"/>
-                            </p:stCondLst>
-                            <p:childTnLst>
-                              <p:par>
-                                <p:cTn id="13" presetID="1" presetClass="entr" presetSubtype="0" fill="hold" grpId="0" nodeType="clickEffect">
-                                  <p:stCondLst>
-                                    <p:cond delay="0"/>
-                                  </p:stCondLst>
-                                  <p:childTnLst>
-                                    <p:set>
-                                      <p:cBhvr>
-                                        <p:cTn id="14" dur="1" fill="hold">
-                                          <p:stCondLst>
-                                            <p:cond delay="0"/>
-                                          </p:stCondLst>
-                                        </p:cTn>
-                                        <p:tgtEl>
-                                          <p:spTgt spid="412675">
-                                            <p:txEl>
-                                              <p:pRg st="4" end="4"/>
-                                            </p:txEl>
-                                          </p:spTgt>
-                                        </p:tgtEl>
-                                        <p:attrNameLst>
-                                          <p:attrName>style.visibility</p:attrName>
-                                        </p:attrNameLst>
-                                      </p:cBhvr>
-                                      <p:to>
-                                        <p:strVal val="visible"/>
-                                      </p:to>
-                                    </p:set>
-                                  </p:childTnLst>
-                                </p:cTn>
-                              </p:par>
-                            </p:childTnLst>
-                          </p:cTn>
-                        </p:par>
-                      </p:childTnLst>
-                    </p:cTn>
-                  </p:par>
-                  <p:par>
-                    <p:cTn id="15" fill="hold">
-                      <p:stCondLst>
-                        <p:cond delay="indefinite"/>
-                      </p:stCondLst>
-                      <p:childTnLst>
-                        <p:par>
-                          <p:cTn id="16" fill="hold">
-                            <p:stCondLst>
-                              <p:cond delay="0"/>
-                            </p:stCondLst>
-                            <p:childTnLst>
-                              <p:par>
-                                <p:cTn id="17" presetID="1" presetClass="entr" presetSubtype="0" fill="hold" grpId="0" nodeType="clickEffect">
-                                  <p:stCondLst>
-                                    <p:cond delay="0"/>
-                                  </p:stCondLst>
-                                  <p:childTnLst>
-                                    <p:set>
-                                      <p:cBhvr>
-                                        <p:cTn id="18" dur="1" fill="hold">
-                                          <p:stCondLst>
-                                            <p:cond delay="0"/>
-                                          </p:stCondLst>
-                                        </p:cTn>
-                                        <p:tgtEl>
-                                          <p:spTgt spid="412675">
-                                            <p:txEl>
-                                              <p:pRg st="5" end="5"/>
-                                            </p:txEl>
-                                          </p:spTgt>
-                                        </p:tgtEl>
-                                        <p:attrNameLst>
-                                          <p:attrName>style.visibility</p:attrName>
-                                        </p:attrNameLst>
-                                      </p:cBhvr>
-                                      <p:to>
-                                        <p:strVal val="visible"/>
-                                      </p:to>
-                                    </p:set>
-                                  </p:childTnLst>
-                                </p:cTn>
-                              </p:par>
-                            </p:childTnLst>
-                          </p:cTn>
-                        </p:par>
-                      </p:childTnLst>
-                    </p:cTn>
-                  </p:par>
-                </p:childTnLst>
-              </p:cTn>
-              <p:prevCondLst>
-                <p:cond evt="onPrev" delay="0">
-                  <p:tgtEl>
-                    <p:sldTgt/>
-                  </p:tgtEl>
-                </p:cond>
-              </p:prevCondLst>
-              <p:nextCondLst>
-                <p:cond evt="onNext" delay="0">
-                  <p:tgtEl>
-                    <p:sldTgt/>
-                  </p:tgtEl>
-                </p:cond>
-              </p:nextCondLst>
-            </p:seq>
-          </p:childTnLst>
-        </p:cTn>
-      </p:par>
-    </p:tnLst>
-    <p:bldLst>
-      <p:bldP spid="412675" grpId="0" build="p"/>
-    </p:bldLst>
   </p:timing>
 </p:sld>
 </file>

</xml_diff>